<commit_message>
slides algo + references
</commit_message>
<xml_diff>
--- a/MyLatexFiles/Report - Nov 06 [slides approach + references]/report nov 06.pptx
+++ b/MyLatexFiles/Report - Nov 06 [slides approach + references]/report nov 06.pptx
@@ -7,24 +7,25 @@
   <p:sldIdLst>
     <p:sldId id="256" r:id="rId2"/>
     <p:sldId id="263" r:id="rId3"/>
-    <p:sldId id="264" r:id="rId4"/>
-    <p:sldId id="268" r:id="rId5"/>
-    <p:sldId id="269" r:id="rId6"/>
-    <p:sldId id="257" r:id="rId7"/>
-    <p:sldId id="265" r:id="rId8"/>
-    <p:sldId id="270" r:id="rId9"/>
-    <p:sldId id="266" r:id="rId10"/>
-    <p:sldId id="258" r:id="rId11"/>
-    <p:sldId id="271" r:id="rId12"/>
-    <p:sldId id="262" r:id="rId13"/>
-    <p:sldId id="259" r:id="rId14"/>
-    <p:sldId id="267" r:id="rId15"/>
-    <p:sldId id="272" r:id="rId16"/>
-    <p:sldId id="273" r:id="rId17"/>
-    <p:sldId id="260" r:id="rId18"/>
-    <p:sldId id="261" r:id="rId19"/>
-    <p:sldId id="274" r:id="rId20"/>
-    <p:sldId id="275" r:id="rId21"/>
+    <p:sldId id="276" r:id="rId4"/>
+    <p:sldId id="264" r:id="rId5"/>
+    <p:sldId id="268" r:id="rId6"/>
+    <p:sldId id="269" r:id="rId7"/>
+    <p:sldId id="257" r:id="rId8"/>
+    <p:sldId id="265" r:id="rId9"/>
+    <p:sldId id="270" r:id="rId10"/>
+    <p:sldId id="266" r:id="rId11"/>
+    <p:sldId id="258" r:id="rId12"/>
+    <p:sldId id="271" r:id="rId13"/>
+    <p:sldId id="262" r:id="rId14"/>
+    <p:sldId id="259" r:id="rId15"/>
+    <p:sldId id="267" r:id="rId16"/>
+    <p:sldId id="272" r:id="rId17"/>
+    <p:sldId id="273" r:id="rId18"/>
+    <p:sldId id="260" r:id="rId19"/>
+    <p:sldId id="261" r:id="rId20"/>
+    <p:sldId id="274" r:id="rId21"/>
+    <p:sldId id="275" r:id="rId22"/>
   </p:sldIdLst>
   <p:sldSz cx="9144000" cy="6858000" type="screen4x3"/>
   <p:notesSz cx="6858000" cy="9144000"/>
@@ -125,7 +126,7 @@
   </p:defaultTextStyle>
   <p:extLst>
     <p:ext uri="{EFAFB233-063F-42B5-8137-9DF3F51BA10A}">
-      <p15:sldGuideLst xmlns:p15="http://schemas.microsoft.com/office/powerpoint/2012/main" xmlns="">
+      <p15:sldGuideLst xmlns="" xmlns:p15="http://schemas.microsoft.com/office/powerpoint/2012/main">
         <p15:guide id="1" orient="horz" pos="2160">
           <p15:clr>
             <a:srgbClr val="A4A3A4"/>
@@ -336,7 +337,7 @@
           <a:p>
             <a:fld id="{13FC77A5-C74F-4F4F-9CE4-1D62494BCE7A}" type="datetimeFigureOut">
               <a:rPr lang="en-US" smtClean="0"/>
-              <a:t>11/2/2015</a:t>
+              <a:t>11/4/2015</a:t>
             </a:fld>
             <a:endParaRPr lang="en-US"/>
           </a:p>
@@ -689,7 +690,7 @@
           <a:p>
             <a:fld id="{13FC77A5-C74F-4F4F-9CE4-1D62494BCE7A}" type="datetimeFigureOut">
               <a:rPr lang="en-US" smtClean="0"/>
-              <a:t>11/2/2015</a:t>
+              <a:t>11/4/2015</a:t>
             </a:fld>
             <a:endParaRPr lang="en-US"/>
           </a:p>
@@ -864,7 +865,7 @@
           <a:p>
             <a:fld id="{13FC77A5-C74F-4F4F-9CE4-1D62494BCE7A}" type="datetimeFigureOut">
               <a:rPr lang="en-US" smtClean="0"/>
-              <a:t>11/2/2015</a:t>
+              <a:t>11/4/2015</a:t>
             </a:fld>
             <a:endParaRPr lang="en-US"/>
           </a:p>
@@ -977,7 +978,7 @@
           <a:p>
             <a:fld id="{13FC77A5-C74F-4F4F-9CE4-1D62494BCE7A}" type="datetimeFigureOut">
               <a:rPr lang="en-US" smtClean="0"/>
-              <a:t>11/2/2015</a:t>
+              <a:t>11/4/2015</a:t>
             </a:fld>
             <a:endParaRPr lang="en-US"/>
           </a:p>
@@ -1335,7 +1336,7 @@
           <a:p>
             <a:fld id="{13FC77A5-C74F-4F4F-9CE4-1D62494BCE7A}" type="datetimeFigureOut">
               <a:rPr lang="en-US" smtClean="0"/>
-              <a:t>11/2/2015</a:t>
+              <a:t>11/4/2015</a:t>
             </a:fld>
             <a:endParaRPr lang="en-US"/>
           </a:p>
@@ -1600,7 +1601,7 @@
           <a:p>
             <a:fld id="{13FC77A5-C74F-4F4F-9CE4-1D62494BCE7A}" type="datetimeFigureOut">
               <a:rPr lang="en-US" smtClean="0"/>
-              <a:t>11/2/2015</a:t>
+              <a:t>11/4/2015</a:t>
             </a:fld>
             <a:endParaRPr lang="en-US"/>
           </a:p>
@@ -1962,7 +1963,7 @@
           <a:p>
             <a:fld id="{13FC77A5-C74F-4F4F-9CE4-1D62494BCE7A}" type="datetimeFigureOut">
               <a:rPr lang="en-US" smtClean="0"/>
-              <a:t>11/2/2015</a:t>
+              <a:t>11/4/2015</a:t>
             </a:fld>
             <a:endParaRPr lang="en-US"/>
           </a:p>
@@ -2189,7 +2190,7 @@
           <a:p>
             <a:fld id="{13FC77A5-C74F-4F4F-9CE4-1D62494BCE7A}" type="datetimeFigureOut">
               <a:rPr lang="en-US" smtClean="0"/>
-              <a:t>11/2/2015</a:t>
+              <a:t>11/4/2015</a:t>
             </a:fld>
             <a:endParaRPr lang="en-US"/>
           </a:p>
@@ -2279,7 +2280,7 @@
           <a:p>
             <a:fld id="{13FC77A5-C74F-4F4F-9CE4-1D62494BCE7A}" type="datetimeFigureOut">
               <a:rPr lang="en-US" smtClean="0"/>
-              <a:t>11/2/2015</a:t>
+              <a:t>11/4/2015</a:t>
             </a:fld>
             <a:endParaRPr lang="en-US"/>
           </a:p>
@@ -2546,7 +2547,7 @@
           <a:p>
             <a:fld id="{13FC77A5-C74F-4F4F-9CE4-1D62494BCE7A}" type="datetimeFigureOut">
               <a:rPr lang="en-US" smtClean="0"/>
-              <a:t>11/2/2015</a:t>
+              <a:t>11/4/2015</a:t>
             </a:fld>
             <a:endParaRPr lang="en-US"/>
           </a:p>
@@ -2774,7 +2775,7 @@
           <a:p>
             <a:fld id="{13FC77A5-C74F-4F4F-9CE4-1D62494BCE7A}" type="datetimeFigureOut">
               <a:rPr lang="en-US" smtClean="0"/>
-              <a:t>11/2/2015</a:t>
+              <a:t>11/4/2015</a:t>
             </a:fld>
             <a:endParaRPr lang="en-US"/>
           </a:p>
@@ -3273,7 +3274,7 @@
           <a:p>
             <a:fld id="{13FC77A5-C74F-4F4F-9CE4-1D62494BCE7A}" type="datetimeFigureOut">
               <a:rPr lang="en-US" smtClean="0"/>
-              <a:t>11/2/2015</a:t>
+              <a:t>11/4/2015</a:t>
             </a:fld>
             <a:endParaRPr lang="en-US"/>
           </a:p>
@@ -3808,6 +3809,679 @@
           <a:lstStyle/>
           <a:p>
             <a:r>
+              <a:rPr lang="en-GB" dirty="0" smtClean="0"/>
+              <a:t>Principle</a:t>
+            </a:r>
+            <a:endParaRPr lang="en-GB" dirty="0"/>
+          </a:p>
+        </p:txBody>
+      </p:sp>
+      <p:sp>
+        <p:nvSpPr>
+          <p:cNvPr id="3" name="Espace réservé du contenu 2"/>
+          <p:cNvSpPr>
+            <a:spLocks noGrp="1"/>
+          </p:cNvSpPr>
+          <p:nvPr>
+            <p:ph sz="quarter" idx="1"/>
+          </p:nvPr>
+        </p:nvSpPr>
+        <p:spPr/>
+        <p:txBody>
+          <a:bodyPr/>
+          <a:lstStyle/>
+          <a:p>
+            <a:pPr marL="0" indent="0" algn="just">
+              <a:buNone/>
+            </a:pPr>
+            <a:r>
+              <a:rPr lang="en-GB" dirty="0" smtClean="0"/>
+              <a:t>Given: (i) a query and user quality preferences; and (ii) a set of concrete services tagged with quality measures.</a:t>
+            </a:r>
+          </a:p>
+          <a:p>
+            <a:pPr algn="just"/>
+            <a:r>
+              <a:rPr lang="en-GB" dirty="0" smtClean="0"/>
+              <a:t>Looks for </a:t>
+            </a:r>
+            <a:r>
+              <a:rPr lang="en-GB" i="1" dirty="0" smtClean="0"/>
+              <a:t>concrete services </a:t>
+            </a:r>
+            <a:r>
+              <a:rPr lang="en-GB" dirty="0" smtClean="0"/>
+              <a:t>which respect the matching rules</a:t>
+            </a:r>
+          </a:p>
+          <a:p>
+            <a:pPr algn="just"/>
+            <a:endParaRPr lang="en-GB" dirty="0" smtClean="0"/>
+          </a:p>
+          <a:p>
+            <a:pPr algn="just"/>
+            <a:r>
+              <a:rPr lang="en-GB" dirty="0" smtClean="0"/>
+              <a:t>The concrete service that matches the rules is a </a:t>
+            </a:r>
+            <a:r>
+              <a:rPr lang="en-GB" i="1" dirty="0" smtClean="0"/>
+              <a:t>candidate concrete service</a:t>
+            </a:r>
+          </a:p>
+          <a:p>
+            <a:pPr algn="just"/>
+            <a:endParaRPr lang="en-GB" dirty="0"/>
+          </a:p>
+          <a:p>
+            <a:pPr algn="just"/>
+            <a:r>
+              <a:rPr lang="en-GB" dirty="0" smtClean="0"/>
+              <a:t>As result we build list of </a:t>
+            </a:r>
+            <a:r>
+              <a:rPr lang="en-GB" i="1" dirty="0" smtClean="0"/>
+              <a:t>candidate concrete services </a:t>
+            </a:r>
+            <a:r>
+              <a:rPr lang="en-GB" dirty="0" smtClean="0"/>
+              <a:t>which may be used in the rewriting process</a:t>
+            </a:r>
+            <a:endParaRPr lang="en-GB" dirty="0"/>
+          </a:p>
+        </p:txBody>
+      </p:sp>
+      <p:sp>
+        <p:nvSpPr>
+          <p:cNvPr id="4" name="Rectangle 3"/>
+          <p:cNvSpPr/>
+          <p:nvPr/>
+        </p:nvSpPr>
+        <p:spPr>
+          <a:xfrm>
+            <a:off x="539552" y="1459681"/>
+            <a:ext cx="8136904" cy="4849639"/>
+          </a:xfrm>
+          <a:prstGeom prst="rect">
+            <a:avLst/>
+          </a:prstGeom>
+        </p:spPr>
+        <p:style>
+          <a:lnRef idx="2">
+            <a:schemeClr val="accent1">
+              <a:shade val="50000"/>
+            </a:schemeClr>
+          </a:lnRef>
+          <a:fillRef idx="1">
+            <a:schemeClr val="accent1"/>
+          </a:fillRef>
+          <a:effectRef idx="0">
+            <a:schemeClr val="accent1"/>
+          </a:effectRef>
+          <a:fontRef idx="minor">
+            <a:schemeClr val="lt1"/>
+          </a:fontRef>
+        </p:style>
+        <p:txBody>
+          <a:bodyPr rtlCol="0" anchor="t"/>
+          <a:lstStyle/>
+          <a:p>
+            <a:pPr algn="just"/>
+            <a:r>
+              <a:rPr lang="en-US" sz="1600" b="1" dirty="0" smtClean="0"/>
+              <a:t>References: </a:t>
+            </a:r>
+            <a:r>
+              <a:rPr lang="en-US" sz="1600" b="1" u="sng" dirty="0" smtClean="0"/>
+              <a:t>web service selection and composition considering QoS aspects</a:t>
+            </a:r>
+          </a:p>
+          <a:p>
+            <a:pPr marL="285750" indent="-285750" algn="just">
+              <a:buFont typeface="Arial" panose="020B0604020202020204" pitchFamily="34" charset="0"/>
+              <a:buChar char="•"/>
+            </a:pPr>
+            <a:r>
+              <a:rPr lang="it-IT" sz="1600" dirty="0"/>
+              <a:t>Valeria Cardellini, Emiliano Casalicchio, Vincenzo </a:t>
+            </a:r>
+            <a:r>
+              <a:rPr lang="it-IT" sz="1600" dirty="0" smtClean="0"/>
+              <a:t>Grassi and Francesco </a:t>
+            </a:r>
+            <a:r>
+              <a:rPr lang="it-IT" sz="1600" dirty="0"/>
+              <a:t>Lo </a:t>
+            </a:r>
+            <a:r>
+              <a:rPr lang="it-IT" sz="1600" dirty="0" smtClean="0"/>
+              <a:t>Presti. </a:t>
+            </a:r>
+            <a:r>
+              <a:rPr lang="en-US" sz="1600" dirty="0"/>
+              <a:t>Scalable Service Selection for Web Service </a:t>
+            </a:r>
+            <a:r>
+              <a:rPr lang="en-US" sz="1600" dirty="0" smtClean="0"/>
+              <a:t>Composition Supporting </a:t>
+            </a:r>
+            <a:r>
+              <a:rPr lang="en-US" sz="1600" dirty="0"/>
+              <a:t>Differentiated QoS </a:t>
+            </a:r>
+            <a:r>
+              <a:rPr lang="en-US" sz="1600" dirty="0" smtClean="0"/>
+              <a:t>Classes. Technical Report RR-07.59, Dip. di </a:t>
+            </a:r>
+            <a:r>
+              <a:rPr lang="en-US" sz="1600" dirty="0" err="1" smtClean="0"/>
+              <a:t>Informatica</a:t>
+            </a:r>
+            <a:r>
+              <a:rPr lang="en-US" sz="1600" dirty="0" smtClean="0"/>
+              <a:t>, </a:t>
+            </a:r>
+            <a:r>
+              <a:rPr lang="en-US" sz="1600" dirty="0" err="1" smtClean="0"/>
+              <a:t>Sistemi</a:t>
+            </a:r>
+            <a:r>
+              <a:rPr lang="en-US" sz="1600" dirty="0" smtClean="0"/>
+              <a:t> e </a:t>
+            </a:r>
+            <a:r>
+              <a:rPr lang="en-US" sz="1600" dirty="0" err="1" smtClean="0"/>
+              <a:t>Produzione</a:t>
+            </a:r>
+            <a:r>
+              <a:rPr lang="en-US" sz="1600" dirty="0" smtClean="0"/>
+              <a:t>, </a:t>
+            </a:r>
+            <a:r>
+              <a:rPr lang="en-US" sz="1600" dirty="0" err="1" smtClean="0"/>
+              <a:t>Università</a:t>
+            </a:r>
+            <a:r>
+              <a:rPr lang="en-US" sz="1600" dirty="0" smtClean="0"/>
+              <a:t> de Roma Tor </a:t>
+            </a:r>
+            <a:r>
+              <a:rPr lang="en-US" sz="1600" dirty="0" err="1" smtClean="0"/>
+              <a:t>Vergata</a:t>
+            </a:r>
+            <a:r>
+              <a:rPr lang="en-US" sz="1600" dirty="0" smtClean="0"/>
+              <a:t>, 2007.</a:t>
+            </a:r>
+          </a:p>
+          <a:p>
+            <a:pPr marL="285750" indent="-285750" algn="just">
+              <a:buFont typeface="Arial" panose="020B0604020202020204" pitchFamily="34" charset="0"/>
+              <a:buChar char="•"/>
+            </a:pPr>
+            <a:r>
+              <a:rPr lang="en-US" sz="1600" dirty="0" err="1" smtClean="0"/>
+              <a:t>Alrifai</a:t>
+            </a:r>
+            <a:r>
+              <a:rPr lang="en-US" sz="1600" dirty="0"/>
+              <a:t>, M., </a:t>
+            </a:r>
+            <a:r>
+              <a:rPr lang="en-US" sz="1600" dirty="0" err="1"/>
+              <a:t>Risse</a:t>
+            </a:r>
+            <a:r>
+              <a:rPr lang="en-US" sz="1600" dirty="0"/>
+              <a:t>, T., </a:t>
+            </a:r>
+            <a:r>
+              <a:rPr lang="en-US" sz="1600" dirty="0" err="1"/>
+              <a:t>Dolog</a:t>
+            </a:r>
+            <a:r>
+              <a:rPr lang="en-US" sz="1600" dirty="0"/>
+              <a:t>, P., and </a:t>
+            </a:r>
+            <a:r>
+              <a:rPr lang="en-US" sz="1600" dirty="0" err="1"/>
+              <a:t>Nejdl</a:t>
+            </a:r>
+            <a:r>
+              <a:rPr lang="en-US" sz="1600" dirty="0"/>
+              <a:t>, W. (2008). </a:t>
+            </a:r>
+            <a:r>
+              <a:rPr lang="en-US" sz="1600" dirty="0" smtClean="0"/>
+              <a:t>A scalable </a:t>
+            </a:r>
+            <a:r>
+              <a:rPr lang="en-US" sz="1600" dirty="0"/>
+              <a:t>approach for </a:t>
+            </a:r>
+            <a:r>
+              <a:rPr lang="en-US" sz="1600" dirty="0" err="1"/>
+              <a:t>qos</a:t>
+            </a:r>
+            <a:r>
+              <a:rPr lang="en-US" sz="1600" dirty="0"/>
+              <a:t>-based web service </a:t>
+            </a:r>
+            <a:r>
+              <a:rPr lang="en-US" sz="1600" dirty="0" smtClean="0"/>
+              <a:t>selection. In </a:t>
+            </a:r>
+            <a:r>
+              <a:rPr lang="en-US" sz="1600" dirty="0"/>
+              <a:t>ICSOC Workshops, pages 190–199</a:t>
+            </a:r>
+            <a:r>
+              <a:rPr lang="en-US" sz="1600" dirty="0" smtClean="0"/>
+              <a:t>.</a:t>
+            </a:r>
+          </a:p>
+          <a:p>
+            <a:pPr marL="285750" indent="-285750" algn="just">
+              <a:buFont typeface="Arial" panose="020B0604020202020204" pitchFamily="34" charset="0"/>
+              <a:buChar char="•"/>
+            </a:pPr>
+            <a:r>
+              <a:rPr lang="en-US" sz="1600" dirty="0" err="1"/>
+              <a:t>Alrifai</a:t>
+            </a:r>
+            <a:r>
+              <a:rPr lang="en-US" sz="1600" dirty="0"/>
+              <a:t>, M., </a:t>
+            </a:r>
+            <a:r>
+              <a:rPr lang="en-US" sz="1600" dirty="0" err="1"/>
+              <a:t>Skoutas</a:t>
+            </a:r>
+            <a:r>
+              <a:rPr lang="en-US" sz="1600" dirty="0"/>
+              <a:t>, D., and </a:t>
+            </a:r>
+            <a:r>
+              <a:rPr lang="en-US" sz="1600" dirty="0" err="1"/>
+              <a:t>Risse</a:t>
+            </a:r>
+            <a:r>
+              <a:rPr lang="en-US" sz="1600" dirty="0"/>
+              <a:t>, T. (2010). </a:t>
+            </a:r>
+            <a:r>
+              <a:rPr lang="en-US" sz="1600" dirty="0" smtClean="0"/>
+              <a:t>Selecting skyline </a:t>
+            </a:r>
+            <a:r>
+              <a:rPr lang="en-US" sz="1600" dirty="0"/>
+              <a:t>services for </a:t>
+            </a:r>
+            <a:r>
+              <a:rPr lang="en-US" sz="1600" dirty="0" err="1"/>
+              <a:t>qos</a:t>
+            </a:r>
+            <a:r>
+              <a:rPr lang="en-US" sz="1600" dirty="0"/>
+              <a:t>-based web service </a:t>
+            </a:r>
+            <a:r>
+              <a:rPr lang="en-US" sz="1600" dirty="0" smtClean="0"/>
+              <a:t>composition. In </a:t>
+            </a:r>
+            <a:r>
+              <a:rPr lang="en-US" sz="1600" dirty="0"/>
+              <a:t>WWW, pages 11–20.</a:t>
+            </a:r>
+          </a:p>
+          <a:p>
+            <a:pPr marL="285750" indent="-285750" algn="just">
+              <a:buFont typeface="Arial" panose="020B0604020202020204" pitchFamily="34" charset="0"/>
+              <a:buChar char="•"/>
+            </a:pPr>
+            <a:r>
+              <a:rPr lang="en-US" sz="1600" dirty="0" smtClean="0"/>
+              <a:t>Karim </a:t>
+            </a:r>
+            <a:r>
+              <a:rPr lang="en-US" sz="1600" dirty="0" err="1"/>
+              <a:t>Benouaret</a:t>
+            </a:r>
+            <a:r>
+              <a:rPr lang="en-US" sz="1600" dirty="0"/>
+              <a:t>, </a:t>
+            </a:r>
+            <a:r>
+              <a:rPr lang="en-US" sz="1600" dirty="0" err="1"/>
+              <a:t>Djamal</a:t>
+            </a:r>
+            <a:r>
+              <a:rPr lang="en-US" sz="1600" dirty="0"/>
+              <a:t> </a:t>
+            </a:r>
+            <a:r>
+              <a:rPr lang="en-US" sz="1600" dirty="0" err="1"/>
+              <a:t>Benslimane</a:t>
+            </a:r>
+            <a:r>
+              <a:rPr lang="en-US" sz="1600" dirty="0"/>
+              <a:t>, </a:t>
+            </a:r>
+            <a:r>
+              <a:rPr lang="en-US" sz="1600" dirty="0" err="1"/>
+              <a:t>Allel</a:t>
+            </a:r>
+            <a:r>
+              <a:rPr lang="en-US" sz="1600" dirty="0"/>
+              <a:t> </a:t>
+            </a:r>
+            <a:r>
+              <a:rPr lang="en-US" sz="1600" dirty="0" err="1"/>
+              <a:t>Hadjali</a:t>
+            </a:r>
+            <a:r>
+              <a:rPr lang="en-US" sz="1600" dirty="0"/>
+              <a:t>, and Mahmoud </a:t>
+            </a:r>
+            <a:r>
+              <a:rPr lang="en-US" sz="1600" dirty="0" err="1"/>
+              <a:t>Barhamgi</a:t>
+            </a:r>
+            <a:r>
+              <a:rPr lang="en-US" sz="1600" dirty="0"/>
+              <a:t>. </a:t>
+            </a:r>
+            <a:r>
+              <a:rPr lang="en-US" sz="1600" dirty="0" err="1"/>
+              <a:t>FuDoCS</a:t>
+            </a:r>
+            <a:r>
+              <a:rPr lang="en-US" sz="1600" dirty="0"/>
+              <a:t>: A Web Service Composition System Based on Fuzzy Dominance for Preference Query answering, September 2011. VLDB - 37th International Conference on Very Large Data Bases - Demo Paper.</a:t>
+            </a:r>
+          </a:p>
+          <a:p>
+            <a:pPr marL="285750" indent="-285750" algn="just">
+              <a:buFont typeface="Arial" panose="020B0604020202020204" pitchFamily="34" charset="0"/>
+              <a:buChar char="•"/>
+            </a:pPr>
+            <a:r>
+              <a:rPr lang="en-US" sz="1600" dirty="0" err="1"/>
+              <a:t>Benouaret</a:t>
+            </a:r>
+            <a:r>
+              <a:rPr lang="en-US" sz="1600" dirty="0"/>
+              <a:t>, K.; </a:t>
+            </a:r>
+            <a:r>
+              <a:rPr lang="en-US" sz="1600" dirty="0" err="1"/>
+              <a:t>Benslimane</a:t>
+            </a:r>
+            <a:r>
+              <a:rPr lang="en-US" sz="1600" dirty="0"/>
+              <a:t>, D.; </a:t>
+            </a:r>
+            <a:r>
+              <a:rPr lang="en-US" sz="1600" dirty="0" err="1"/>
+              <a:t>Hadjali</a:t>
+            </a:r>
+            <a:r>
+              <a:rPr lang="en-US" sz="1600" dirty="0"/>
+              <a:t>, A., "Selecting Skyline Web Services for Multiple Users Preferences," in </a:t>
+            </a:r>
+            <a:r>
+              <a:rPr lang="en-US" sz="1600" i="1" dirty="0"/>
+              <a:t>Web Services (ICWS), 2012 IEEE 19th International Conference on</a:t>
+            </a:r>
+            <a:r>
+              <a:rPr lang="en-US" sz="1600" dirty="0"/>
+              <a:t> , vol., no., pp.635-636, 24-29 June </a:t>
+            </a:r>
+            <a:r>
+              <a:rPr lang="en-US" sz="1600" dirty="0" smtClean="0"/>
+              <a:t>2012</a:t>
+            </a:r>
+          </a:p>
+          <a:p>
+            <a:pPr marL="285750" indent="-285750" algn="just">
+              <a:buFont typeface="Arial" panose="020B0604020202020204" pitchFamily="34" charset="0"/>
+              <a:buChar char="•"/>
+            </a:pPr>
+            <a:r>
+              <a:rPr lang="en-US" sz="1600" dirty="0" err="1"/>
+              <a:t>Cheikh</a:t>
+            </a:r>
+            <a:r>
+              <a:rPr lang="en-US" sz="1600" dirty="0"/>
+              <a:t> Ba, Umberto Costa, </a:t>
+            </a:r>
+            <a:r>
+              <a:rPr lang="en-US" sz="1600" dirty="0" err="1"/>
+              <a:t>Mirian</a:t>
+            </a:r>
+            <a:r>
+              <a:rPr lang="en-US" sz="1600" dirty="0"/>
+              <a:t> </a:t>
+            </a:r>
+            <a:r>
+              <a:rPr lang="en-US" sz="1600" dirty="0" err="1"/>
+              <a:t>Halfeld</a:t>
+            </a:r>
+            <a:r>
+              <a:rPr lang="en-US" sz="1600" dirty="0"/>
+              <a:t> Ferrari, </a:t>
+            </a:r>
+            <a:r>
+              <a:rPr lang="en-US" sz="1600" dirty="0" err="1" smtClean="0"/>
+              <a:t>Rémy</a:t>
+            </a:r>
+            <a:r>
+              <a:rPr lang="en-US" sz="1600" dirty="0" smtClean="0"/>
+              <a:t> </a:t>
+            </a:r>
+            <a:r>
+              <a:rPr lang="en-US" sz="1600" dirty="0" err="1"/>
+              <a:t>Ferre</a:t>
+            </a:r>
+            <a:r>
+              <a:rPr lang="en-US" sz="1600" dirty="0"/>
+              <a:t>, Martin A. </a:t>
+            </a:r>
+            <a:r>
+              <a:rPr lang="en-US" sz="1600" dirty="0" err="1" smtClean="0"/>
+              <a:t>Musicante</a:t>
+            </a:r>
+            <a:r>
+              <a:rPr lang="en-US" sz="1600" dirty="0" smtClean="0"/>
+              <a:t>, </a:t>
+            </a:r>
+            <a:r>
+              <a:rPr lang="en-US" sz="1600" dirty="0" err="1" smtClean="0"/>
+              <a:t>Veronika</a:t>
+            </a:r>
+            <a:r>
+              <a:rPr lang="en-US" sz="1600" dirty="0" smtClean="0"/>
+              <a:t> </a:t>
+            </a:r>
+            <a:r>
+              <a:rPr lang="en-US" sz="1600" dirty="0"/>
+              <a:t>Peralta, and Sophie Robert. Preference-Driven </a:t>
+            </a:r>
+            <a:r>
+              <a:rPr lang="en-US" sz="1600" dirty="0" smtClean="0"/>
+              <a:t>Refinement </a:t>
+            </a:r>
+            <a:r>
+              <a:rPr lang="en-US" sz="1600" dirty="0"/>
+              <a:t>of Service </a:t>
+            </a:r>
+            <a:r>
+              <a:rPr lang="en-US" sz="1600" dirty="0" smtClean="0"/>
+              <a:t>Compositions</a:t>
+            </a:r>
+            <a:r>
+              <a:rPr lang="en-US" sz="1600" dirty="0"/>
+              <a:t>. In CLOSER (4th International Conference on Cloud Computing and Services </a:t>
+            </a:r>
+            <a:r>
+              <a:rPr lang="en-US" sz="1600" dirty="0" smtClean="0"/>
+              <a:t>Science</a:t>
+            </a:r>
+            <a:r>
+              <a:rPr lang="en-US" sz="1600" dirty="0"/>
+              <a:t>), Proceedings of CLOSER 2014, page 8 pages, Barcelona, Spain, April 2014. </a:t>
+            </a:r>
+            <a:r>
+              <a:rPr lang="en-US" sz="1600" dirty="0" smtClean="0"/>
+              <a:t>POSTER presentation</a:t>
+            </a:r>
+            <a:r>
+              <a:rPr lang="en-US" sz="1600" dirty="0"/>
+              <a:t>.</a:t>
+            </a:r>
+          </a:p>
+          <a:p>
+            <a:pPr algn="just"/>
+            <a:endParaRPr lang="en-US" sz="1600" dirty="0"/>
+          </a:p>
+          <a:p>
+            <a:pPr algn="just"/>
+            <a:endParaRPr lang="en-US" sz="1600" u="sng" dirty="0" smtClean="0"/>
+          </a:p>
+        </p:txBody>
+      </p:sp>
+    </p:spTree>
+    <p:extLst>
+      <p:ext uri="{BB962C8B-B14F-4D97-AF65-F5344CB8AC3E}">
+        <p14:creationId xmlns:p14="http://schemas.microsoft.com/office/powerpoint/2010/main" val="1751865181"/>
+      </p:ext>
+    </p:extLst>
+  </p:cSld>
+  <p:clrMapOvr>
+    <a:masterClrMapping/>
+  </p:clrMapOvr>
+  <p:timing>
+    <p:tnLst>
+      <p:par>
+        <p:cTn id="1" dur="indefinite" restart="never" nodeType="tmRoot">
+          <p:childTnLst>
+            <p:seq concurrent="1" nextAc="seek">
+              <p:cTn id="2" dur="indefinite" nodeType="mainSeq">
+                <p:childTnLst>
+                  <p:par>
+                    <p:cTn id="3" fill="hold">
+                      <p:stCondLst>
+                        <p:cond delay="indefinite"/>
+                      </p:stCondLst>
+                      <p:childTnLst>
+                        <p:par>
+                          <p:cTn id="4" fill="hold">
+                            <p:stCondLst>
+                              <p:cond delay="0"/>
+                            </p:stCondLst>
+                            <p:childTnLst>
+                              <p:par>
+                                <p:cTn id="5" presetID="14" presetClass="entr" presetSubtype="10" fill="hold" grpId="0" nodeType="clickEffect">
+                                  <p:stCondLst>
+                                    <p:cond delay="0"/>
+                                  </p:stCondLst>
+                                  <p:childTnLst>
+                                    <p:set>
+                                      <p:cBhvr>
+                                        <p:cTn id="6" dur="1" fill="hold">
+                                          <p:stCondLst>
+                                            <p:cond delay="0"/>
+                                          </p:stCondLst>
+                                        </p:cTn>
+                                        <p:tgtEl>
+                                          <p:spTgt spid="4"/>
+                                        </p:tgtEl>
+                                        <p:attrNameLst>
+                                          <p:attrName>style.visibility</p:attrName>
+                                        </p:attrNameLst>
+                                      </p:cBhvr>
+                                      <p:to>
+                                        <p:strVal val="visible"/>
+                                      </p:to>
+                                    </p:set>
+                                    <p:animEffect transition="in" filter="randombar(horizontal)">
+                                      <p:cBhvr>
+                                        <p:cTn id="7" dur="500"/>
+                                        <p:tgtEl>
+                                          <p:spTgt spid="4"/>
+                                        </p:tgtEl>
+                                      </p:cBhvr>
+                                    </p:animEffect>
+                                  </p:childTnLst>
+                                </p:cTn>
+                              </p:par>
+                            </p:childTnLst>
+                          </p:cTn>
+                        </p:par>
+                      </p:childTnLst>
+                    </p:cTn>
+                  </p:par>
+                </p:childTnLst>
+              </p:cTn>
+              <p:prevCondLst>
+                <p:cond evt="onPrev" delay="0">
+                  <p:tgtEl>
+                    <p:sldTgt/>
+                  </p:tgtEl>
+                </p:cond>
+              </p:prevCondLst>
+              <p:nextCondLst>
+                <p:cond evt="onNext" delay="0">
+                  <p:tgtEl>
+                    <p:sldTgt/>
+                  </p:tgtEl>
+                </p:cond>
+              </p:nextCondLst>
+            </p:seq>
+          </p:childTnLst>
+        </p:cTn>
+      </p:par>
+    </p:tnLst>
+    <p:bldLst>
+      <p:bldP spid="4" grpId="0" animBg="1"/>
+    </p:bldLst>
+  </p:timing>
+</p:sld>
+</file>
+
+<file path=ppt/slides/slide11.xml><?xml version="1.0" encoding="utf-8"?>
+<p:sld xmlns:a="http://schemas.openxmlformats.org/drawingml/2006/main" xmlns:r="http://schemas.openxmlformats.org/officeDocument/2006/relationships" xmlns:p="http://schemas.openxmlformats.org/presentationml/2006/main">
+  <p:cSld>
+    <p:spTree>
+      <p:nvGrpSpPr>
+        <p:cNvPr id="1" name=""/>
+        <p:cNvGrpSpPr/>
+        <p:nvPr/>
+      </p:nvGrpSpPr>
+      <p:grpSpPr>
+        <a:xfrm>
+          <a:off x="0" y="0"/>
+          <a:ext cx="0" cy="0"/>
+          <a:chOff x="0" y="0"/>
+          <a:chExt cx="0" cy="0"/>
+        </a:xfrm>
+      </p:grpSpPr>
+      <p:sp>
+        <p:nvSpPr>
+          <p:cNvPr id="2" name="Titre 1"/>
+          <p:cNvSpPr>
+            <a:spLocks noGrp="1"/>
+          </p:cNvSpPr>
+          <p:nvPr>
+            <p:ph type="title"/>
+          </p:nvPr>
+        </p:nvSpPr>
+        <p:spPr/>
+        <p:txBody>
+          <a:bodyPr/>
+          <a:lstStyle/>
+          <a:p>
+            <a:r>
               <a:rPr lang="en-US" dirty="0" smtClean="0"/>
               <a:t>Example: Input data to the Rhône</a:t>
             </a:r>
@@ -4581,7 +5255,7 @@
 </p:sld>
 </file>
 
-<file path=ppt/slides/slide11.xml><?xml version="1.0" encoding="utf-8"?>
+<file path=ppt/slides/slide12.xml><?xml version="1.0" encoding="utf-8"?>
 <p:sld xmlns:a="http://schemas.openxmlformats.org/drawingml/2006/main" xmlns:r="http://schemas.openxmlformats.org/officeDocument/2006/relationships" xmlns:p="http://schemas.openxmlformats.org/presentationml/2006/main">
   <p:cSld>
     <p:spTree>
@@ -5047,7 +5721,7 @@
 </p:sld>
 </file>
 
-<file path=ppt/slides/slide12.xml><?xml version="1.0" encoding="utf-8"?>
+<file path=ppt/slides/slide13.xml><?xml version="1.0" encoding="utf-8"?>
 <p:sld xmlns:a="http://schemas.openxmlformats.org/drawingml/2006/main" xmlns:r="http://schemas.openxmlformats.org/officeDocument/2006/relationships" xmlns:p="http://schemas.openxmlformats.org/presentationml/2006/main">
   <p:cSld>
     <p:spTree>
@@ -5806,7 +6480,7 @@
 </p:sld>
 </file>
 
-<file path=ppt/slides/slide13.xml><?xml version="1.0" encoding="utf-8"?>
+<file path=ppt/slides/slide14.xml><?xml version="1.0" encoding="utf-8"?>
 <p:sld xmlns:a="http://schemas.openxmlformats.org/drawingml/2006/main" xmlns:r="http://schemas.openxmlformats.org/officeDocument/2006/relationships" xmlns:p="http://schemas.openxmlformats.org/presentationml/2006/main">
   <p:cSld>
     <p:spTree>
@@ -5842,11 +6516,7 @@
           <a:p>
             <a:r>
               <a:rPr lang="en-US" dirty="0" smtClean="0"/>
-              <a:t>Example: selecting </a:t>
-            </a:r>
-            <a:r>
-              <a:rPr lang="en-US" dirty="0" smtClean="0"/>
-              <a:t>candidate concrete services</a:t>
+              <a:t>Example: selecting candidate concrete services</a:t>
             </a:r>
             <a:endParaRPr lang="en-US" dirty="0"/>
           </a:p>
@@ -6516,160 +7186,6 @@
 </p:sld>
 </file>
 
-<file path=ppt/slides/slide14.xml><?xml version="1.0" encoding="utf-8"?>
-<p:sld xmlns:a="http://schemas.openxmlformats.org/drawingml/2006/main" xmlns:r="http://schemas.openxmlformats.org/officeDocument/2006/relationships" xmlns:p="http://schemas.openxmlformats.org/presentationml/2006/main">
-  <p:cSld>
-    <p:spTree>
-      <p:nvGrpSpPr>
-        <p:cNvPr id="1" name=""/>
-        <p:cNvGrpSpPr/>
-        <p:nvPr/>
-      </p:nvGrpSpPr>
-      <p:grpSpPr>
-        <a:xfrm>
-          <a:off x="0" y="0"/>
-          <a:ext cx="0" cy="0"/>
-          <a:chOff x="0" y="0"/>
-          <a:chExt cx="0" cy="0"/>
-        </a:xfrm>
-      </p:grpSpPr>
-      <p:sp>
-        <p:nvSpPr>
-          <p:cNvPr id="2" name="Titre 1"/>
-          <p:cNvSpPr>
-            <a:spLocks noGrp="1"/>
-          </p:cNvSpPr>
-          <p:nvPr>
-            <p:ph type="title"/>
-          </p:nvPr>
-        </p:nvSpPr>
-        <p:spPr/>
-        <p:txBody>
-          <a:bodyPr anchor="ctr">
-            <a:normAutofit/>
-          </a:bodyPr>
-          <a:lstStyle/>
-          <a:p>
-            <a:r>
-              <a:rPr lang="en-GB" sz="2800" dirty="0" smtClean="0"/>
-              <a:t>Problem: creating concrete service description</a:t>
-            </a:r>
-            <a:endParaRPr lang="en-GB" sz="2800" dirty="0"/>
-          </a:p>
-        </p:txBody>
-      </p:sp>
-      <p:sp>
-        <p:nvSpPr>
-          <p:cNvPr id="3" name="Espace réservé du contenu 2"/>
-          <p:cNvSpPr>
-            <a:spLocks noGrp="1"/>
-          </p:cNvSpPr>
-          <p:nvPr>
-            <p:ph sz="quarter" idx="1"/>
-          </p:nvPr>
-        </p:nvSpPr>
-        <p:spPr/>
-        <p:txBody>
-          <a:bodyPr/>
-          <a:lstStyle/>
-          <a:p>
-            <a:pPr marL="0" indent="0" algn="just">
-              <a:buNone/>
-            </a:pPr>
-            <a:r>
-              <a:rPr lang="en-GB" dirty="0" smtClean="0"/>
-              <a:t>Given a set of candidate concrete services selected by using the matching rules discussed before</a:t>
-            </a:r>
-            <a:endParaRPr lang="en-GB" dirty="0" smtClean="0"/>
-          </a:p>
-          <a:p>
-            <a:pPr algn="just"/>
-            <a:endParaRPr lang="en-GB" dirty="0"/>
-          </a:p>
-          <a:p>
-            <a:pPr algn="just"/>
-            <a:r>
-              <a:rPr lang="en-GB" dirty="0" smtClean="0"/>
-              <a:t>Create </a:t>
-            </a:r>
-            <a:r>
-              <a:rPr lang="en-GB" i="1" dirty="0" smtClean="0"/>
-              <a:t>concrete service description (CSD) </a:t>
-            </a:r>
-            <a:r>
-              <a:rPr lang="en-GB" dirty="0" smtClean="0"/>
-              <a:t>to used in the rewriting process. CSD maps abstract services and variables of a concrete service to abstract services and variables in the query</a:t>
-            </a:r>
-          </a:p>
-          <a:p>
-            <a:pPr marL="0" indent="0" algn="just">
-              <a:buNone/>
-            </a:pPr>
-            <a:r>
-              <a:rPr lang="en-GB" dirty="0" smtClean="0"/>
-              <a:t> </a:t>
-            </a:r>
-          </a:p>
-          <a:p>
-            <a:pPr algn="just"/>
-            <a:r>
-              <a:rPr lang="en-GB" dirty="0" smtClean="0"/>
-              <a:t>A CSD is created if the mapping of variables is possible</a:t>
-            </a:r>
-            <a:endParaRPr lang="en-GB" dirty="0" smtClean="0"/>
-          </a:p>
-          <a:p>
-            <a:pPr algn="just"/>
-            <a:endParaRPr lang="en-GB" dirty="0"/>
-          </a:p>
-        </p:txBody>
-      </p:sp>
-      <p:sp>
-        <p:nvSpPr>
-          <p:cNvPr id="4" name="ZoneTexte 3"/>
-          <p:cNvSpPr txBox="1"/>
-          <p:nvPr/>
-        </p:nvSpPr>
-        <p:spPr>
-          <a:xfrm>
-            <a:off x="4688732" y="2315183"/>
-            <a:ext cx="184731" cy="369332"/>
-          </a:xfrm>
-          <a:prstGeom prst="rect">
-            <a:avLst/>
-          </a:prstGeom>
-          <a:noFill/>
-        </p:spPr>
-        <p:txBody>
-          <a:bodyPr wrap="none" rtlCol="0">
-            <a:spAutoFit/>
-          </a:bodyPr>
-          <a:lstStyle/>
-          <a:p>
-            <a:endParaRPr lang="en-GB" dirty="0"/>
-          </a:p>
-        </p:txBody>
-      </p:sp>
-    </p:spTree>
-    <p:extLst>
-      <p:ext uri="{BB962C8B-B14F-4D97-AF65-F5344CB8AC3E}">
-        <p14:creationId xmlns:p14="http://schemas.microsoft.com/office/powerpoint/2010/main" val="1195223375"/>
-      </p:ext>
-    </p:extLst>
-  </p:cSld>
-  <p:clrMapOvr>
-    <a:masterClrMapping/>
-  </p:clrMapOvr>
-  <p:timing>
-    <p:tnLst>
-      <p:par>
-        <p:cTn id="1" dur="indefinite" restart="never" nodeType="tmRoot"/>
-      </p:par>
-    </p:tnLst>
-  </p:timing>
-</p:sld>
-</file>
-
 <file path=ppt/slides/slide15.xml><?xml version="1.0" encoding="utf-8"?>
 <p:sld xmlns:a="http://schemas.openxmlformats.org/drawingml/2006/main" xmlns:r="http://schemas.openxmlformats.org/officeDocument/2006/relationships" xmlns:p="http://schemas.openxmlformats.org/presentationml/2006/main">
   <p:cSld>
@@ -6724,9 +7240,7 @@
         </p:nvSpPr>
         <p:spPr/>
         <p:txBody>
-          <a:bodyPr>
-            <a:normAutofit fontScale="92500" lnSpcReduction="10000"/>
-          </a:bodyPr>
+          <a:bodyPr/>
           <a:lstStyle/>
           <a:p>
             <a:pPr marL="0" indent="0" algn="just">
@@ -6734,42 +7248,26 @@
             </a:pPr>
             <a:r>
               <a:rPr lang="en-GB" dirty="0" smtClean="0"/>
-              <a:t>Mapping rules: </a:t>
+              <a:t>Given a set of candidate concrete services selected by using the matching rules discussed before</a:t>
             </a:r>
           </a:p>
           <a:p>
             <a:pPr algn="just"/>
+            <a:endParaRPr lang="en-GB" dirty="0"/>
+          </a:p>
+          <a:p>
+            <a:pPr algn="just"/>
+            <a:r>
+              <a:rPr lang="en-GB" dirty="0" smtClean="0"/>
+              <a:t>Create </a:t>
+            </a:r>
             <a:r>
               <a:rPr lang="en-GB" i="1" dirty="0" smtClean="0"/>
-              <a:t>Rule 1</a:t>
+              <a:t>concrete service description (CSD) </a:t>
             </a:r>
             <a:r>
               <a:rPr lang="en-GB" dirty="0" smtClean="0"/>
-              <a:t>: </a:t>
-            </a:r>
-            <a:r>
-              <a:rPr lang="en-GB" i="1" dirty="0" smtClean="0"/>
-              <a:t>head</a:t>
-            </a:r>
-            <a:r>
-              <a:rPr lang="en-GB" dirty="0" smtClean="0"/>
-              <a:t> variables in the concrete service can be mapped to </a:t>
-            </a:r>
-            <a:r>
-              <a:rPr lang="en-GB" i="1" dirty="0" smtClean="0"/>
-              <a:t>head</a:t>
-            </a:r>
-            <a:r>
-              <a:rPr lang="en-GB" dirty="0" smtClean="0"/>
-              <a:t> or </a:t>
-            </a:r>
-            <a:r>
-              <a:rPr lang="en-GB" i="1" dirty="0" smtClean="0"/>
-              <a:t>local</a:t>
-            </a:r>
-            <a:r>
-              <a:rPr lang="en-GB" dirty="0" smtClean="0"/>
-              <a:t> variables in the query if they are from the same type</a:t>
+              <a:t>to used in the rewriting process. CSD maps abstract services and variables of a concrete service to abstract services and variables in the query</a:t>
             </a:r>
           </a:p>
           <a:p>
@@ -6784,73 +7282,13 @@
           <a:p>
             <a:pPr algn="just"/>
             <a:r>
-              <a:rPr lang="en-GB" i="1" dirty="0" smtClean="0"/>
-              <a:t>Rule 2</a:t>
-            </a:r>
-            <a:r>
               <a:rPr lang="en-GB" dirty="0" smtClean="0"/>
-              <a:t>: </a:t>
-            </a:r>
-            <a:r>
-              <a:rPr lang="en-GB" i="1" dirty="0" smtClean="0"/>
-              <a:t>local</a:t>
-            </a:r>
-            <a:r>
-              <a:rPr lang="en-GB" dirty="0" smtClean="0"/>
-              <a:t> variables in the concrete service can be mapped to </a:t>
-            </a:r>
-            <a:r>
-              <a:rPr lang="en-GB" i="1" dirty="0" smtClean="0"/>
-              <a:t>head</a:t>
-            </a:r>
-            <a:r>
-              <a:rPr lang="en-GB" dirty="0" smtClean="0"/>
-              <a:t> variables in the query if they are from the same type</a:t>
-            </a:r>
-            <a:endParaRPr lang="en-GB" dirty="0" smtClean="0"/>
+              <a:t>A CSD is created if the mapping of variables is possible</a:t>
+            </a:r>
           </a:p>
           <a:p>
             <a:pPr algn="just"/>
-            <a:endParaRPr lang="en-GB" dirty="0" smtClean="0"/>
-          </a:p>
-          <a:p>
-            <a:pPr algn="just"/>
-            <a:r>
-              <a:rPr lang="en-GB" i="1" dirty="0" smtClean="0"/>
-              <a:t>Rule 3</a:t>
-            </a:r>
-            <a:r>
-              <a:rPr lang="en-GB" dirty="0" smtClean="0"/>
-              <a:t>: </a:t>
-            </a:r>
-            <a:r>
-              <a:rPr lang="en-GB" i="1" dirty="0" smtClean="0"/>
-              <a:t>local</a:t>
-            </a:r>
-            <a:r>
-              <a:rPr lang="en-GB" dirty="0" smtClean="0"/>
-              <a:t> variable in the concrete service can be mapped to a </a:t>
-            </a:r>
-            <a:r>
-              <a:rPr lang="en-GB" i="1" dirty="0" smtClean="0"/>
-              <a:t>local</a:t>
-            </a:r>
-            <a:r>
-              <a:rPr lang="en-GB" dirty="0" smtClean="0"/>
-              <a:t> variable in the query if: (i) </a:t>
-            </a:r>
-            <a:r>
-              <a:rPr lang="en-GB" dirty="0"/>
-              <a:t>t</a:t>
-            </a:r>
-            <a:r>
-              <a:rPr lang="en-GB" dirty="0" smtClean="0"/>
-              <a:t>hey are from the same type; and (ii) the c</a:t>
-            </a:r>
-            <a:r>
-              <a:rPr lang="en-GB" dirty="0" smtClean="0"/>
-              <a:t>oncrete service cover all abstract service in the query that depends on this variable. Depends here means that this local variable is used as input in another abstract service.</a:t>
-            </a:r>
+            <a:endParaRPr lang="en-GB" dirty="0"/>
           </a:p>
         </p:txBody>
       </p:sp>
@@ -6883,7 +7321,7 @@
     </p:spTree>
     <p:extLst>
       <p:ext uri="{BB962C8B-B14F-4D97-AF65-F5344CB8AC3E}">
-        <p14:creationId xmlns:p14="http://schemas.microsoft.com/office/powerpoint/2010/main" val="3554097174"/>
+        <p14:creationId xmlns:p14="http://schemas.microsoft.com/office/powerpoint/2010/main" val="1195223375"/>
       </p:ext>
     </p:extLst>
   </p:cSld>
@@ -6929,14 +7367,16 @@
         </p:nvSpPr>
         <p:spPr/>
         <p:txBody>
-          <a:bodyPr/>
+          <a:bodyPr anchor="ctr">
+            <a:normAutofit/>
+          </a:bodyPr>
           <a:lstStyle/>
           <a:p>
             <a:r>
-              <a:rPr lang="en-US" dirty="0" smtClean="0"/>
-              <a:t>Principle</a:t>
-            </a:r>
-            <a:endParaRPr lang="en-US" dirty="0"/>
+              <a:rPr lang="en-GB" sz="2800" dirty="0" smtClean="0"/>
+              <a:t>Problem: creating concrete service description</a:t>
+            </a:r>
+            <a:endParaRPr lang="en-GB" sz="2800" dirty="0"/>
           </a:p>
         </p:txBody>
       </p:sp>
@@ -6952,57 +7392,161 @@
         </p:nvSpPr>
         <p:spPr/>
         <p:txBody>
-          <a:bodyPr/>
+          <a:bodyPr>
+            <a:normAutofit fontScale="92500" lnSpcReduction="10000"/>
+          </a:bodyPr>
           <a:lstStyle/>
           <a:p>
             <a:pPr marL="0" indent="0" algn="just">
               <a:buNone/>
             </a:pPr>
             <a:r>
-              <a:rPr lang="en-US" dirty="0" smtClean="0"/>
-              <a:t>Given a list of candidate concrete services</a:t>
+              <a:rPr lang="en-GB" dirty="0" smtClean="0"/>
+              <a:t>Mapping rules: </a:t>
             </a:r>
           </a:p>
           <a:p>
             <a:pPr algn="just"/>
-            <a:endParaRPr lang="en-US" dirty="0" smtClean="0"/>
+            <a:r>
+              <a:rPr lang="en-GB" i="1" dirty="0" smtClean="0"/>
+              <a:t>Rule 1</a:t>
+            </a:r>
+            <a:r>
+              <a:rPr lang="en-GB" dirty="0" smtClean="0"/>
+              <a:t>: </a:t>
+            </a:r>
+            <a:r>
+              <a:rPr lang="en-GB" i="1" dirty="0" smtClean="0"/>
+              <a:t>head</a:t>
+            </a:r>
+            <a:r>
+              <a:rPr lang="en-GB" dirty="0" smtClean="0"/>
+              <a:t> variables in the concrete service can be mapped to </a:t>
+            </a:r>
+            <a:r>
+              <a:rPr lang="en-GB" i="1" dirty="0" smtClean="0"/>
+              <a:t>head</a:t>
+            </a:r>
+            <a:r>
+              <a:rPr lang="en-GB" dirty="0" smtClean="0"/>
+              <a:t> or </a:t>
+            </a:r>
+            <a:r>
+              <a:rPr lang="en-GB" i="1" dirty="0" smtClean="0"/>
+              <a:t>local</a:t>
+            </a:r>
+            <a:r>
+              <a:rPr lang="en-GB" dirty="0" smtClean="0"/>
+              <a:t> variables in the query if they are from the same type</a:t>
+            </a:r>
+          </a:p>
+          <a:p>
+            <a:pPr marL="0" indent="0" algn="just">
+              <a:buNone/>
+            </a:pPr>
+            <a:r>
+              <a:rPr lang="en-GB" dirty="0" smtClean="0"/>
+              <a:t> </a:t>
+            </a:r>
           </a:p>
           <a:p>
             <a:pPr algn="just"/>
             <a:r>
-              <a:rPr lang="en-US" dirty="0" smtClean="0"/>
-              <a:t>Look for candidate concrete services that satisfy the variable mapping rules explained before</a:t>
+              <a:rPr lang="en-GB" i="1" dirty="0" smtClean="0"/>
+              <a:t>Rule 2</a:t>
+            </a:r>
+            <a:r>
+              <a:rPr lang="en-GB" dirty="0" smtClean="0"/>
+              <a:t>: </a:t>
+            </a:r>
+            <a:r>
+              <a:rPr lang="en-GB" i="1" dirty="0" smtClean="0"/>
+              <a:t>local</a:t>
+            </a:r>
+            <a:r>
+              <a:rPr lang="en-GB" dirty="0" smtClean="0"/>
+              <a:t> variables in the concrete service can be mapped to </a:t>
+            </a:r>
+            <a:r>
+              <a:rPr lang="en-GB" i="1" dirty="0" smtClean="0"/>
+              <a:t>head</a:t>
+            </a:r>
+            <a:r>
+              <a:rPr lang="en-GB" dirty="0" smtClean="0"/>
+              <a:t> variables in the query if they are from the same type</a:t>
             </a:r>
           </a:p>
           <a:p>
             <a:pPr algn="just"/>
-            <a:endParaRPr lang="en-US" dirty="0" smtClean="0"/>
+            <a:endParaRPr lang="en-GB" dirty="0" smtClean="0"/>
           </a:p>
           <a:p>
             <a:pPr algn="just"/>
             <a:r>
-              <a:rPr lang="en-US" dirty="0" smtClean="0"/>
-              <a:t>Create a CSD for each concrete service that matches the rules</a:t>
-            </a:r>
-          </a:p>
-          <a:p>
-            <a:pPr algn="just"/>
-            <a:endParaRPr lang="en-US" dirty="0" smtClean="0"/>
-          </a:p>
-          <a:p>
-            <a:pPr algn="just"/>
-            <a:r>
-              <a:rPr lang="en-US" dirty="0" smtClean="0"/>
-              <a:t>Resulting in a list of CSDs that will be used for rewriting the query</a:t>
-            </a:r>
-            <a:endParaRPr lang="en-US" dirty="0"/>
+              <a:rPr lang="en-GB" i="1" dirty="0" smtClean="0"/>
+              <a:t>Rule 3</a:t>
+            </a:r>
+            <a:r>
+              <a:rPr lang="en-GB" dirty="0" smtClean="0"/>
+              <a:t>: </a:t>
+            </a:r>
+            <a:r>
+              <a:rPr lang="en-GB" i="1" dirty="0" smtClean="0"/>
+              <a:t>local</a:t>
+            </a:r>
+            <a:r>
+              <a:rPr lang="en-GB" dirty="0" smtClean="0"/>
+              <a:t> variable in the concrete service can be mapped to a </a:t>
+            </a:r>
+            <a:r>
+              <a:rPr lang="en-GB" i="1" dirty="0" smtClean="0"/>
+              <a:t>local</a:t>
+            </a:r>
+            <a:r>
+              <a:rPr lang="en-GB" dirty="0" smtClean="0"/>
+              <a:t> variable in the query if: (i) </a:t>
+            </a:r>
+            <a:r>
+              <a:rPr lang="en-GB" dirty="0"/>
+              <a:t>t</a:t>
+            </a:r>
+            <a:r>
+              <a:rPr lang="en-GB" dirty="0" smtClean="0"/>
+              <a:t>hey are from the same type; and (ii) the concrete service cover all abstract service in the query that depends on this variable. Depends here means that this local variable is used as input in another abstract service.</a:t>
+            </a:r>
+          </a:p>
+        </p:txBody>
+      </p:sp>
+      <p:sp>
+        <p:nvSpPr>
+          <p:cNvPr id="4" name="ZoneTexte 3"/>
+          <p:cNvSpPr txBox="1"/>
+          <p:nvPr/>
+        </p:nvSpPr>
+        <p:spPr>
+          <a:xfrm>
+            <a:off x="4688732" y="2315183"/>
+            <a:ext cx="184731" cy="369332"/>
+          </a:xfrm>
+          <a:prstGeom prst="rect">
+            <a:avLst/>
+          </a:prstGeom>
+          <a:noFill/>
+        </p:spPr>
+        <p:txBody>
+          <a:bodyPr wrap="none" rtlCol="0">
+            <a:spAutoFit/>
+          </a:bodyPr>
+          <a:lstStyle/>
+          <a:p>
+            <a:endParaRPr lang="en-GB" dirty="0"/>
           </a:p>
         </p:txBody>
       </p:sp>
     </p:spTree>
     <p:extLst>
       <p:ext uri="{BB962C8B-B14F-4D97-AF65-F5344CB8AC3E}">
-        <p14:creationId xmlns:p14="http://schemas.microsoft.com/office/powerpoint/2010/main" val="310304349"/>
+        <p14:creationId xmlns:p14="http://schemas.microsoft.com/office/powerpoint/2010/main" val="3554097174"/>
       </p:ext>
     </p:extLst>
   </p:cSld>
@@ -7053,11 +7597,7 @@
           <a:p>
             <a:r>
               <a:rPr lang="en-US" dirty="0" smtClean="0"/>
-              <a:t>Example: creating </a:t>
-            </a:r>
-            <a:r>
-              <a:rPr lang="en-US" dirty="0" smtClean="0"/>
-              <a:t>CSDs</a:t>
+              <a:t>Principle</a:t>
             </a:r>
             <a:endParaRPr lang="en-US" dirty="0"/>
           </a:p>
@@ -7083,81 +7623,40 @@
             </a:pPr>
             <a:r>
               <a:rPr lang="en-US" dirty="0" smtClean="0"/>
-              <a:t>Once we have the selected candidate concrete services, the algorithm tries to create CSDs using these concrete services. </a:t>
-            </a:r>
-            <a:endParaRPr lang="en-US" dirty="0"/>
-          </a:p>
-        </p:txBody>
-      </p:sp>
-      <p:pic>
-        <p:nvPicPr>
-          <p:cNvPr id="5" name="Espace réservé du contenu 3"/>
-          <p:cNvPicPr>
-            <a:picLocks noChangeAspect="1"/>
-          </p:cNvPicPr>
-          <p:nvPr/>
-        </p:nvPicPr>
-        <p:blipFill>
-          <a:blip r:embed="rId2">
-            <a:extLst>
-              <a:ext uri="{28A0092B-C50C-407E-A947-70E740481C1C}">
-                <a14:useLocalDpi xmlns:a14="http://schemas.microsoft.com/office/drawing/2010/main" val="0"/>
-              </a:ext>
-            </a:extLst>
-          </a:blip>
-          <a:stretch>
-            <a:fillRect/>
-          </a:stretch>
-        </p:blipFill>
-        <p:spPr>
-          <a:xfrm>
-            <a:off x="179512" y="2702460"/>
-            <a:ext cx="8815448" cy="987495"/>
-          </a:xfrm>
-          <a:prstGeom prst="rect">
-            <a:avLst/>
-          </a:prstGeom>
-        </p:spPr>
-      </p:pic>
-      <p:sp>
-        <p:nvSpPr>
-          <p:cNvPr id="7" name="Rectangle 6"/>
-          <p:cNvSpPr/>
-          <p:nvPr/>
-        </p:nvSpPr>
-        <p:spPr>
-          <a:xfrm>
-            <a:off x="110237" y="4005064"/>
-            <a:ext cx="8856984" cy="576065"/>
-          </a:xfrm>
-          <a:prstGeom prst="rect">
-            <a:avLst/>
-          </a:prstGeom>
-        </p:spPr>
-        <p:style>
-          <a:lnRef idx="2">
-            <a:schemeClr val="accent1">
-              <a:shade val="50000"/>
-            </a:schemeClr>
-          </a:lnRef>
-          <a:fillRef idx="1">
-            <a:schemeClr val="accent1"/>
-          </a:fillRef>
-          <a:effectRef idx="0">
-            <a:schemeClr val="accent1"/>
-          </a:effectRef>
-          <a:fontRef idx="minor">
-            <a:schemeClr val="lt1"/>
-          </a:fontRef>
-        </p:style>
-        <p:txBody>
-          <a:bodyPr rtlCol="0" anchor="ctr"/>
-          <a:lstStyle/>
-          <a:p>
-            <a:pPr algn="ctr"/>
+              <a:t>Given a list of candidate concrete services</a:t>
+            </a:r>
+          </a:p>
+          <a:p>
+            <a:pPr algn="just"/>
+            <a:endParaRPr lang="en-US" dirty="0" smtClean="0"/>
+          </a:p>
+          <a:p>
+            <a:pPr algn="just"/>
             <a:r>
               <a:rPr lang="en-US" dirty="0" smtClean="0"/>
-              <a:t>CSDS for all candidate services are created since they does not violate rules to create CSDs.</a:t>
+              <a:t>Look for candidate concrete services that satisfy the variable mapping rules explained before</a:t>
+            </a:r>
+          </a:p>
+          <a:p>
+            <a:pPr algn="just"/>
+            <a:endParaRPr lang="en-US" dirty="0" smtClean="0"/>
+          </a:p>
+          <a:p>
+            <a:pPr algn="just"/>
+            <a:r>
+              <a:rPr lang="en-US" dirty="0" smtClean="0"/>
+              <a:t>Create a CSD for each concrete service that matches the rules</a:t>
+            </a:r>
+          </a:p>
+          <a:p>
+            <a:pPr algn="just"/>
+            <a:endParaRPr lang="en-US" dirty="0" smtClean="0"/>
+          </a:p>
+          <a:p>
+            <a:pPr algn="just"/>
+            <a:r>
+              <a:rPr lang="en-US" dirty="0" smtClean="0"/>
+              <a:t>Resulting in a list of CSDs that will be used for rewriting the query</a:t>
             </a:r>
             <a:endParaRPr lang="en-US" dirty="0"/>
           </a:p>
@@ -7166,7 +7665,7 @@
     </p:spTree>
     <p:extLst>
       <p:ext uri="{BB962C8B-B14F-4D97-AF65-F5344CB8AC3E}">
-        <p14:creationId xmlns:p14="http://schemas.microsoft.com/office/powerpoint/2010/main" val="3672776266"/>
+        <p14:creationId xmlns:p14="http://schemas.microsoft.com/office/powerpoint/2010/main" val="310304349"/>
       </p:ext>
     </p:extLst>
   </p:cSld>
@@ -7217,11 +7716,7 @@
           <a:p>
             <a:r>
               <a:rPr lang="en-US" dirty="0" smtClean="0"/>
-              <a:t>Example: combining </a:t>
-            </a:r>
-            <a:r>
-              <a:rPr lang="en-US" dirty="0" smtClean="0"/>
-              <a:t>all CSDs</a:t>
+              <a:t>Example: creating CSDs</a:t>
             </a:r>
             <a:endParaRPr lang="en-US" dirty="0"/>
           </a:p>
@@ -7242,86 +7737,95 @@
           <a:bodyPr/>
           <a:lstStyle/>
           <a:p>
-            <a:pPr marL="0" indent="0">
+            <a:pPr marL="0" indent="0" algn="just">
               <a:buNone/>
             </a:pPr>
             <a:r>
               <a:rPr lang="en-US" dirty="0" smtClean="0"/>
-              <a:t>Given a list </a:t>
-            </a:r>
+              <a:t>Once we have the selected candidate concrete services, the algorithm tries to create CSDs using these concrete services. </a:t>
+            </a:r>
+            <a:endParaRPr lang="en-US" dirty="0"/>
+          </a:p>
+        </p:txBody>
+      </p:sp>
+      <p:pic>
+        <p:nvPicPr>
+          <p:cNvPr id="5" name="Espace réservé du contenu 3"/>
+          <p:cNvPicPr>
+            <a:picLocks noChangeAspect="1"/>
+          </p:cNvPicPr>
+          <p:nvPr/>
+        </p:nvPicPr>
+        <p:blipFill>
+          <a:blip r:embed="rId2">
+            <a:extLst>
+              <a:ext uri="{28A0092B-C50C-407E-A947-70E740481C1C}">
+                <a14:useLocalDpi xmlns:a14="http://schemas.microsoft.com/office/drawing/2010/main" val="0"/>
+              </a:ext>
+            </a:extLst>
+          </a:blip>
+          <a:stretch>
+            <a:fillRect/>
+          </a:stretch>
+        </p:blipFill>
+        <p:spPr>
+          <a:xfrm>
+            <a:off x="179512" y="2702460"/>
+            <a:ext cx="8815448" cy="987495"/>
+          </a:xfrm>
+          <a:prstGeom prst="rect">
+            <a:avLst/>
+          </a:prstGeom>
+        </p:spPr>
+      </p:pic>
+      <p:sp>
+        <p:nvSpPr>
+          <p:cNvPr id="7" name="Rectangle 6"/>
+          <p:cNvSpPr/>
+          <p:nvPr/>
+        </p:nvSpPr>
+        <p:spPr>
+          <a:xfrm>
+            <a:off x="110237" y="4005064"/>
+            <a:ext cx="8856984" cy="576065"/>
+          </a:xfrm>
+          <a:prstGeom prst="rect">
+            <a:avLst/>
+          </a:prstGeom>
+        </p:spPr>
+        <p:style>
+          <a:lnRef idx="2">
+            <a:schemeClr val="accent1">
+              <a:shade val="50000"/>
+            </a:schemeClr>
+          </a:lnRef>
+          <a:fillRef idx="1">
+            <a:schemeClr val="accent1"/>
+          </a:fillRef>
+          <a:effectRef idx="0">
+            <a:schemeClr val="accent1"/>
+          </a:effectRef>
+          <a:fontRef idx="minor">
+            <a:schemeClr val="lt1"/>
+          </a:fontRef>
+        </p:style>
+        <p:txBody>
+          <a:bodyPr rtlCol="0" anchor="ctr"/>
+          <a:lstStyle/>
+          <a:p>
+            <a:pPr algn="ctr"/>
             <a:r>
               <a:rPr lang="en-US" dirty="0" smtClean="0"/>
-              <a:t>of </a:t>
-            </a:r>
-            <a:r>
-              <a:rPr lang="en-US" dirty="0" smtClean="0"/>
-              <a:t>CSDs, produce all possible combinations of them</a:t>
-            </a:r>
-          </a:p>
-          <a:p>
-            <a:pPr marL="0" indent="0">
-              <a:buNone/>
-            </a:pPr>
-            <a:endParaRPr lang="en-US" dirty="0" smtClean="0"/>
-          </a:p>
-          <a:p>
-            <a:pPr marL="0" indent="0">
-              <a:buNone/>
-            </a:pPr>
-            <a:r>
-              <a:rPr lang="en-US" dirty="0" smtClean="0"/>
-              <a:t>Considering that we have the CSDs: A, B and C, the algorithm generates all combinations as follows</a:t>
-            </a:r>
-          </a:p>
-          <a:p>
-            <a:pPr marL="0" indent="0">
-              <a:buNone/>
-            </a:pPr>
-            <a:endParaRPr lang="en-US" dirty="0" smtClean="0"/>
-          </a:p>
-          <a:p>
-            <a:pPr marL="0" indent="0">
-              <a:buNone/>
-            </a:pPr>
-            <a:r>
-              <a:rPr lang="en-US" dirty="0" smtClean="0"/>
-              <a:t>		A		B		C</a:t>
-            </a:r>
-          </a:p>
-          <a:p>
-            <a:pPr marL="0" indent="0">
-              <a:buNone/>
-            </a:pPr>
-            <a:r>
-              <a:rPr lang="en-US" dirty="0" smtClean="0"/>
-              <a:t>		A B		B C</a:t>
-            </a:r>
-          </a:p>
-          <a:p>
-            <a:pPr marL="0" indent="0">
-              <a:buNone/>
-            </a:pPr>
-            <a:r>
-              <a:rPr lang="en-US" dirty="0" smtClean="0"/>
-              <a:t>		A C		</a:t>
-            </a:r>
-          </a:p>
-          <a:p>
-            <a:pPr marL="0" indent="0">
-              <a:buNone/>
-            </a:pPr>
-            <a:r>
-              <a:rPr lang="en-US" dirty="0" smtClean="0"/>
-              <a:t>		A B C</a:t>
-            </a:r>
-            <a:endParaRPr lang="en-US" dirty="0" smtClean="0"/>
+              <a:t>CSDS for all candidate services are created since they does not violate rules to create CSDs.</a:t>
+            </a:r>
+            <a:endParaRPr lang="en-US" dirty="0"/>
           </a:p>
         </p:txBody>
       </p:sp>
     </p:spTree>
     <p:extLst>
       <p:ext uri="{BB962C8B-B14F-4D97-AF65-F5344CB8AC3E}">
-        <p14:creationId xmlns:p14="http://schemas.microsoft.com/office/powerpoint/2010/main" val="2758060841"/>
+        <p14:creationId xmlns:p14="http://schemas.microsoft.com/office/powerpoint/2010/main" val="3672776266"/>
       </p:ext>
     </p:extLst>
   </p:cSld>
@@ -7372,11 +7876,7 @@
           <a:p>
             <a:r>
               <a:rPr lang="en-US" dirty="0" smtClean="0"/>
-              <a:t>Example</a:t>
-            </a:r>
-            <a:r>
-              <a:rPr lang="en-US" dirty="0"/>
-              <a:t>: finding valid rewritings</a:t>
+              <a:t>Example: combining all CSDs</a:t>
             </a:r>
             <a:endParaRPr lang="en-US" dirty="0"/>
           </a:p>
@@ -7394,88 +7894,80 @@
         </p:nvSpPr>
         <p:spPr/>
         <p:txBody>
-          <a:bodyPr>
-            <a:normAutofit fontScale="92500" lnSpcReduction="10000"/>
-          </a:bodyPr>
+          <a:bodyPr/>
           <a:lstStyle/>
           <a:p>
-            <a:pPr marL="0" indent="0" algn="just">
+            <a:pPr marL="0" indent="0">
               <a:buNone/>
             </a:pPr>
             <a:r>
               <a:rPr lang="en-US" dirty="0" smtClean="0"/>
-              <a:t>Given a list of combinations of CSDs (a list of lists), identify which of them is a valid rewriting of the original query.</a:t>
-            </a:r>
-          </a:p>
-          <a:p>
-            <a:pPr marL="0" indent="0" algn="just">
+              <a:t>Given a list of CSDs, produce all possible combinations of them</a:t>
+            </a:r>
+          </a:p>
+          <a:p>
+            <a:pPr marL="0" indent="0">
               <a:buNone/>
             </a:pPr>
             <a:endParaRPr lang="en-US" dirty="0" smtClean="0"/>
           </a:p>
           <a:p>
-            <a:pPr marL="0" indent="0" algn="just">
+            <a:pPr marL="0" indent="0">
               <a:buNone/>
             </a:pPr>
             <a:r>
               <a:rPr lang="en-US" dirty="0" smtClean="0"/>
-              <a:t>A combination of CSDs is a valid rewriting if:</a:t>
-            </a:r>
-          </a:p>
-          <a:p>
-            <a:pPr lvl="1" algn="just"/>
-            <a:r>
-              <a:rPr lang="en-US" dirty="0" smtClean="0"/>
-              <a:t>The number of abstract services in the query is equal to the result of adding the number of abstract services of each CSD</a:t>
-            </a:r>
-          </a:p>
-          <a:p>
-            <a:pPr lvl="1" algn="just"/>
-            <a:r>
-              <a:rPr lang="en-US" dirty="0" smtClean="0"/>
-              <a:t>There is no duplicity/redundancy of abstract services in the list of CSD</a:t>
-            </a:r>
-          </a:p>
-          <a:p>
-            <a:pPr lvl="1" algn="just"/>
-            <a:r>
-              <a:rPr lang="en-US" dirty="0" smtClean="0"/>
-              <a:t>All </a:t>
-            </a:r>
-            <a:r>
-              <a:rPr lang="en-US" i="1" dirty="0" smtClean="0"/>
-              <a:t>head</a:t>
-            </a:r>
-            <a:r>
-              <a:rPr lang="en-US" dirty="0" smtClean="0"/>
-              <a:t> variables in the query must be mapped to a variable in one of the concrete services in the list of CSDs</a:t>
-            </a:r>
-          </a:p>
-          <a:p>
-            <a:pPr lvl="1" algn="just"/>
-            <a:r>
-              <a:rPr lang="en-US" dirty="0" smtClean="0"/>
-              <a:t>If the query has a composite measure, this measure is updated for each rewriting produced, and this measure can not be violated</a:t>
-            </a:r>
-          </a:p>
-          <a:p>
-            <a:pPr marL="0" indent="0" algn="just">
+              <a:t>Considering that we have the CSDs: A, B and C, the algorithm generates all combinations as follows</a:t>
+            </a:r>
+          </a:p>
+          <a:p>
+            <a:pPr marL="0" indent="0">
               <a:buNone/>
             </a:pPr>
             <a:endParaRPr lang="en-US" dirty="0" smtClean="0"/>
           </a:p>
           <a:p>
-            <a:pPr marL="0" indent="0" algn="just">
+            <a:pPr marL="0" indent="0">
               <a:buNone/>
             </a:pPr>
-            <a:endParaRPr lang="en-US" dirty="0" smtClean="0"/>
+            <a:r>
+              <a:rPr lang="en-US" dirty="0" smtClean="0"/>
+              <a:t>		A		B		C</a:t>
+            </a:r>
+          </a:p>
+          <a:p>
+            <a:pPr marL="0" indent="0">
+              <a:buNone/>
+            </a:pPr>
+            <a:r>
+              <a:rPr lang="en-US" dirty="0" smtClean="0"/>
+              <a:t>		A B		B C</a:t>
+            </a:r>
+          </a:p>
+          <a:p>
+            <a:pPr marL="0" indent="0">
+              <a:buNone/>
+            </a:pPr>
+            <a:r>
+              <a:rPr lang="en-US" dirty="0" smtClean="0"/>
+              <a:t>		A C		</a:t>
+            </a:r>
+          </a:p>
+          <a:p>
+            <a:pPr marL="0" indent="0">
+              <a:buNone/>
+            </a:pPr>
+            <a:r>
+              <a:rPr lang="en-US" dirty="0" smtClean="0"/>
+              <a:t>		A B C</a:t>
+            </a:r>
           </a:p>
         </p:txBody>
       </p:sp>
     </p:spTree>
     <p:extLst>
       <p:ext uri="{BB962C8B-B14F-4D97-AF65-F5344CB8AC3E}">
-        <p14:creationId xmlns:p14="http://schemas.microsoft.com/office/powerpoint/2010/main" val="3457335242"/>
+        <p14:creationId xmlns:p14="http://schemas.microsoft.com/office/powerpoint/2010/main" val="2758060841"/>
       </p:ext>
     </p:extLst>
   </p:cSld>
@@ -7559,11 +8051,7 @@
             <a:pPr algn="just"/>
             <a:r>
               <a:rPr lang="en-GB" dirty="0" smtClean="0"/>
-              <a:t>A </a:t>
-            </a:r>
-            <a:r>
-              <a:rPr lang="en-GB" dirty="0" smtClean="0"/>
-              <a:t>set of </a:t>
+              <a:t>A set of </a:t>
             </a:r>
             <a:r>
               <a:rPr lang="en-GB" b="1" dirty="0" smtClean="0"/>
@@ -7575,11 +8063,7 @@
             </a:r>
             <a:r>
               <a:rPr lang="en-GB" b="1" dirty="0" smtClean="0"/>
-              <a:t>concrete </a:t>
-            </a:r>
-            <a:r>
-              <a:rPr lang="en-GB" b="1" dirty="0" smtClean="0"/>
-              <a:t>services</a:t>
+              <a:t>concrete services</a:t>
             </a:r>
             <a:r>
               <a:rPr lang="en-GB" dirty="0" smtClean="0"/>
@@ -7598,19 +8082,11 @@
             </a:r>
             <a:r>
               <a:rPr lang="en-GB" dirty="0" smtClean="0"/>
-              <a:t> and </a:t>
-            </a:r>
-            <a:r>
-              <a:rPr lang="en-GB" dirty="0" smtClean="0"/>
-              <a:t>a set of </a:t>
+              <a:t> and a set of </a:t>
             </a:r>
             <a:r>
               <a:rPr lang="en-GB" b="1" dirty="0" smtClean="0"/>
-              <a:t>quality </a:t>
-            </a:r>
-            <a:r>
-              <a:rPr lang="en-GB" b="1" dirty="0" smtClean="0"/>
-              <a:t>preferences</a:t>
+              <a:t>quality preferences</a:t>
             </a:r>
           </a:p>
           <a:p>
@@ -7625,15 +8101,7 @@
             </a:pPr>
             <a:r>
               <a:rPr lang="en-GB" dirty="0" smtClean="0"/>
-              <a:t>Derive </a:t>
-            </a:r>
-            <a:r>
-              <a:rPr lang="en-GB" dirty="0" smtClean="0"/>
-              <a:t>a  set of service compositions that answer the query and fulfil the quality </a:t>
-            </a:r>
-            <a:r>
-              <a:rPr lang="en-GB" dirty="0" smtClean="0"/>
-              <a:t>requirements.</a:t>
+              <a:t>Derive a  set of service compositions that answer the query and fulfil the quality requirements.</a:t>
             </a:r>
             <a:endParaRPr lang="en-GB" dirty="0"/>
           </a:p>
@@ -7675,39 +8143,355 @@
           <a:lstStyle/>
           <a:p>
             <a:r>
-              <a:rPr lang="en-US" b="1" dirty="0" smtClean="0"/>
-              <a:t>References:</a:t>
-            </a:r>
-          </a:p>
-          <a:p>
-            <a:r>
-              <a:rPr lang="en-US" b="1" dirty="0" smtClean="0"/>
-              <a:t>Query rewriting algorithms in the database domain</a:t>
-            </a:r>
-            <a:r>
-              <a:rPr lang="en-US" dirty="0" smtClean="0"/>
-              <a:t>:</a:t>
-            </a:r>
-          </a:p>
-          <a:p>
-            <a:endParaRPr lang="en-US" dirty="0" smtClean="0"/>
-          </a:p>
-          <a:p>
-            <a:endParaRPr lang="en-US" dirty="0" smtClean="0"/>
-          </a:p>
-          <a:p>
-            <a:endParaRPr lang="en-US" dirty="0" smtClean="0"/>
-          </a:p>
-          <a:p>
-            <a:r>
-              <a:rPr lang="en-US" b="1" dirty="0" smtClean="0"/>
-              <a:t>Query rewriting algorithms in the service composition domain</a:t>
-            </a:r>
-            <a:r>
-              <a:rPr lang="en-US" dirty="0" smtClean="0"/>
-              <a:t>:</a:t>
-            </a:r>
-            <a:endParaRPr lang="en-US" dirty="0"/>
+              <a:rPr lang="en-US" sz="1600" b="1" dirty="0" smtClean="0"/>
+              <a:t>References: </a:t>
+            </a:r>
+            <a:r>
+              <a:rPr lang="en-US" sz="1600" b="1" u="sng" dirty="0" smtClean="0"/>
+              <a:t>Query </a:t>
+            </a:r>
+            <a:r>
+              <a:rPr lang="en-US" sz="1600" b="1" u="sng" dirty="0" smtClean="0"/>
+              <a:t>rewriting algorithms in the service composition </a:t>
+            </a:r>
+            <a:r>
+              <a:rPr lang="en-US" sz="1600" b="1" u="sng" dirty="0" smtClean="0"/>
+              <a:t>domain</a:t>
+            </a:r>
+            <a:endParaRPr lang="en-US" sz="1600" u="sng" dirty="0" smtClean="0"/>
+          </a:p>
+          <a:p>
+            <a:pPr marL="285750" indent="-285750" algn="just">
+              <a:buFont typeface="Arial" panose="020B0604020202020204" pitchFamily="34" charset="0"/>
+              <a:buChar char="•"/>
+            </a:pPr>
+            <a:r>
+              <a:rPr lang="en-US" sz="1600" dirty="0" err="1"/>
+              <a:t>Linhua</a:t>
+            </a:r>
+            <a:r>
+              <a:rPr lang="en-US" sz="1600" dirty="0"/>
+              <a:t> Zhou and </a:t>
+            </a:r>
+            <a:r>
+              <a:rPr lang="en-US" sz="1600" dirty="0" err="1"/>
+              <a:t>Huajun</a:t>
+            </a:r>
+            <a:r>
+              <a:rPr lang="en-US" sz="1600" dirty="0"/>
+              <a:t> Chen and Yu Tong and Jun Ma and </a:t>
+            </a:r>
+            <a:r>
+              <a:rPr lang="en-US" sz="1600" dirty="0" err="1"/>
+              <a:t>Zhaohui</a:t>
+            </a:r>
+            <a:r>
+              <a:rPr lang="en-US" sz="1600" dirty="0"/>
+              <a:t> </a:t>
+            </a:r>
+            <a:r>
+              <a:rPr lang="en-US" sz="1600" dirty="0" smtClean="0"/>
+              <a:t>Wu. </a:t>
+            </a:r>
+            <a:r>
+              <a:rPr lang="en-US" sz="1600" dirty="0"/>
+              <a:t>Ontology-based Scientific Data Service Composition: A Query Rewriting-based </a:t>
+            </a:r>
+            <a:r>
+              <a:rPr lang="en-US" sz="1600" dirty="0" smtClean="0"/>
+              <a:t>Approach. 2008.</a:t>
+            </a:r>
+          </a:p>
+          <a:p>
+            <a:pPr marL="285750" indent="-285750" algn="just">
+              <a:buFont typeface="Arial" panose="020B0604020202020204" pitchFamily="34" charset="0"/>
+              <a:buChar char="•"/>
+            </a:pPr>
+            <a:r>
+              <a:rPr lang="en-US" sz="1600" dirty="0" smtClean="0"/>
+              <a:t>M</a:t>
+            </a:r>
+            <a:r>
+              <a:rPr lang="en-US" sz="1600" dirty="0"/>
+              <a:t>. </a:t>
+            </a:r>
+            <a:r>
+              <a:rPr lang="en-US" sz="1600" dirty="0" err="1"/>
+              <a:t>Barhamgi</a:t>
+            </a:r>
+            <a:r>
+              <a:rPr lang="en-US" sz="1600" dirty="0"/>
+              <a:t>, D. </a:t>
+            </a:r>
+            <a:r>
+              <a:rPr lang="en-US" sz="1600" dirty="0" err="1"/>
+              <a:t>Benslimane</a:t>
+            </a:r>
+            <a:r>
+              <a:rPr lang="en-US" sz="1600" dirty="0"/>
+              <a:t>, and B. </a:t>
+            </a:r>
+            <a:r>
+              <a:rPr lang="en-US" sz="1600" dirty="0" err="1"/>
+              <a:t>Medjahed</a:t>
+            </a:r>
+            <a:r>
+              <a:rPr lang="en-US" sz="1600" dirty="0"/>
+              <a:t>. A query rewriting approach for web </a:t>
+            </a:r>
+            <a:r>
+              <a:rPr lang="en-US" sz="1600" dirty="0" smtClean="0"/>
+              <a:t>service composition</a:t>
+            </a:r>
+            <a:r>
+              <a:rPr lang="en-US" sz="1600" dirty="0"/>
+              <a:t>. Services Computing, IEEE Transactions on, 3(3):</a:t>
+            </a:r>
+            <a:r>
+              <a:rPr lang="en-US" sz="1600" dirty="0" smtClean="0"/>
+              <a:t>206-222</a:t>
+            </a:r>
+            <a:r>
+              <a:rPr lang="en-US" sz="1600" dirty="0"/>
+              <a:t>, July 2010</a:t>
+            </a:r>
+            <a:r>
+              <a:rPr lang="en-US" sz="1600" dirty="0" smtClean="0"/>
+              <a:t>.</a:t>
+            </a:r>
+          </a:p>
+          <a:p>
+            <a:pPr marL="285750" indent="-285750" algn="just">
+              <a:buFont typeface="Arial" panose="020B0604020202020204" pitchFamily="34" charset="0"/>
+              <a:buChar char="•"/>
+            </a:pPr>
+            <a:r>
+              <a:rPr lang="en-US" sz="1600" dirty="0" smtClean="0"/>
+              <a:t>Zhao</a:t>
+            </a:r>
+            <a:r>
+              <a:rPr lang="en-US" sz="1600" dirty="0"/>
+              <a:t>, W., Liu, C., and Chen, J</a:t>
+            </a:r>
+            <a:r>
+              <a:rPr lang="en-US" sz="1600" dirty="0" smtClean="0"/>
+              <a:t>. </a:t>
+            </a:r>
+            <a:r>
+              <a:rPr lang="en-US" sz="1600" dirty="0"/>
+              <a:t>Automatic </a:t>
+            </a:r>
+            <a:r>
+              <a:rPr lang="en-US" sz="1600" dirty="0" smtClean="0"/>
+              <a:t>composition </a:t>
+            </a:r>
+            <a:r>
+              <a:rPr lang="en-US" sz="1600" dirty="0"/>
+              <a:t>of information-providing web services based on query rewriting. Science China Information Sciences, pages </a:t>
+            </a:r>
+            <a:r>
+              <a:rPr lang="en-US" sz="1600" dirty="0" smtClean="0"/>
+              <a:t>1–17, 2011.</a:t>
+            </a:r>
+          </a:p>
+          <a:p>
+            <a:pPr marL="285750" indent="-285750" algn="just">
+              <a:buFont typeface="Arial" panose="020B0604020202020204" pitchFamily="34" charset="0"/>
+              <a:buChar char="•"/>
+            </a:pPr>
+            <a:r>
+              <a:rPr lang="en-US" sz="1600" dirty="0" err="1"/>
+              <a:t>Mesmoudi</a:t>
+            </a:r>
+            <a:r>
+              <a:rPr lang="en-US" sz="1600" dirty="0"/>
+              <a:t>, A., </a:t>
+            </a:r>
+            <a:r>
+              <a:rPr lang="en-US" sz="1600" dirty="0" err="1"/>
+              <a:t>Mrissa</a:t>
+            </a:r>
+            <a:r>
+              <a:rPr lang="en-US" sz="1600" dirty="0"/>
+              <a:t>, M., and </a:t>
+            </a:r>
+            <a:r>
+              <a:rPr lang="en-US" sz="1600" dirty="0" err="1"/>
+              <a:t>Hacid</a:t>
+            </a:r>
+            <a:r>
+              <a:rPr lang="en-US" sz="1600" dirty="0"/>
+              <a:t>, M.-S. (2011). </a:t>
+            </a:r>
+            <a:r>
+              <a:rPr lang="en-US" sz="1600" dirty="0" smtClean="0"/>
+              <a:t>Combining configuration </a:t>
+            </a:r>
+            <a:r>
+              <a:rPr lang="en-US" sz="1600" dirty="0"/>
+              <a:t>and query rewriting for web </a:t>
+            </a:r>
+            <a:r>
+              <a:rPr lang="en-US" sz="1600" dirty="0" smtClean="0"/>
+              <a:t>service composition</a:t>
+            </a:r>
+            <a:r>
+              <a:rPr lang="en-US" sz="1600" dirty="0"/>
+              <a:t>. In ICWS, pages 113–120.</a:t>
+            </a:r>
+          </a:p>
+          <a:p>
+            <a:pPr marL="285750" indent="-285750" algn="just">
+              <a:buFont typeface="Arial" panose="020B0604020202020204" pitchFamily="34" charset="0"/>
+              <a:buChar char="•"/>
+            </a:pPr>
+            <a:r>
+              <a:rPr lang="en-US" sz="1600" dirty="0" err="1" smtClean="0"/>
+              <a:t>Paiva</a:t>
+            </a:r>
+            <a:r>
+              <a:rPr lang="en-US" sz="1600" dirty="0" smtClean="0"/>
+              <a:t> </a:t>
+            </a:r>
+            <a:r>
+              <a:rPr lang="en-US" sz="1600" dirty="0" err="1"/>
+              <a:t>Tizzo</a:t>
+            </a:r>
+            <a:r>
+              <a:rPr lang="en-US" sz="1600" dirty="0"/>
+              <a:t>, N.; </a:t>
+            </a:r>
+            <a:r>
+              <a:rPr lang="en-US" sz="1600" dirty="0" err="1"/>
+              <a:t>Coello</a:t>
+            </a:r>
+            <a:r>
+              <a:rPr lang="en-US" sz="1600" dirty="0"/>
+              <a:t>, J.M.A.; Cardozo, E., "Improving dynamic Web service selection in WS-BPEL using SPARQL," in Systems, Man, and Cybernetics (SMC), 2011 IEEE International Conference on , vol., no., pp.864-871, 9-12 Oct. 2011</a:t>
+            </a:r>
+            <a:endParaRPr lang="en-US" sz="1600" dirty="0" smtClean="0"/>
+          </a:p>
+          <a:p>
+            <a:pPr marL="285750" indent="-285750" algn="just">
+              <a:buFont typeface="Arial" panose="020B0604020202020204" pitchFamily="34" charset="0"/>
+              <a:buChar char="•"/>
+            </a:pPr>
+            <a:r>
+              <a:rPr lang="en-US" sz="1600" dirty="0" err="1"/>
+              <a:t>Oulmakhzoune</a:t>
+            </a:r>
+            <a:r>
+              <a:rPr lang="en-US" sz="1600" dirty="0"/>
+              <a:t>, S.; </a:t>
+            </a:r>
+            <a:r>
+              <a:rPr lang="en-US" sz="1600" dirty="0" err="1"/>
+              <a:t>Cuppens-Boulahia</a:t>
+            </a:r>
+            <a:r>
+              <a:rPr lang="en-US" sz="1600" dirty="0"/>
+              <a:t>, N.; </a:t>
+            </a:r>
+            <a:r>
+              <a:rPr lang="en-US" sz="1600" dirty="0" err="1"/>
+              <a:t>Cuppens</a:t>
+            </a:r>
+            <a:r>
+              <a:rPr lang="en-US" sz="1600" dirty="0"/>
+              <a:t>, F.; </a:t>
+            </a:r>
+            <a:r>
+              <a:rPr lang="en-US" sz="1600" dirty="0" err="1"/>
+              <a:t>Morucci</a:t>
+            </a:r>
+            <a:r>
+              <a:rPr lang="en-US" sz="1600" dirty="0"/>
+              <a:t>, S., "Privacy Policy Preferences Enforced by SPARQL Query Rewriting," in Availability, Reliability and Security (ARES), 2012 Seventh International Conference on , vol., no., pp.335-342, 20-24 Aug. 2012</a:t>
+            </a:r>
+            <a:endParaRPr lang="en-US" sz="1600" dirty="0" smtClean="0"/>
+          </a:p>
+          <a:p>
+            <a:pPr marL="285750" indent="-285750" algn="just">
+              <a:buFont typeface="Arial" panose="020B0604020202020204" pitchFamily="34" charset="0"/>
+              <a:buChar char="•"/>
+            </a:pPr>
+            <a:r>
+              <a:rPr lang="en-US" sz="1600" dirty="0" smtClean="0"/>
+              <a:t>Umberto S</a:t>
+            </a:r>
+            <a:r>
+              <a:rPr lang="en-US" sz="1600" dirty="0"/>
+              <a:t>. Costa, </a:t>
+            </a:r>
+            <a:r>
+              <a:rPr lang="en-US" sz="1600" dirty="0" err="1" smtClean="0"/>
+              <a:t>Mirian</a:t>
+            </a:r>
+            <a:r>
+              <a:rPr lang="en-US" sz="1600" dirty="0" smtClean="0"/>
+              <a:t> </a:t>
+            </a:r>
+            <a:r>
+              <a:rPr lang="en-US" sz="1600" dirty="0" err="1" smtClean="0"/>
+              <a:t>Halfeld</a:t>
+            </a:r>
+            <a:r>
+              <a:rPr lang="en-US" sz="1600" dirty="0" smtClean="0"/>
+              <a:t> </a:t>
+            </a:r>
+            <a:r>
+              <a:rPr lang="en-US" sz="1600" dirty="0"/>
+              <a:t>Ferrari, </a:t>
+            </a:r>
+            <a:r>
+              <a:rPr lang="en-US" sz="1600" dirty="0" smtClean="0"/>
+              <a:t>Martin A</a:t>
+            </a:r>
+            <a:r>
+              <a:rPr lang="en-US" sz="1600" dirty="0"/>
+              <a:t>. </a:t>
+            </a:r>
+            <a:r>
+              <a:rPr lang="en-US" sz="1600" dirty="0" err="1"/>
+              <a:t>Musicante</a:t>
+            </a:r>
+            <a:r>
+              <a:rPr lang="en-US" sz="1600" dirty="0"/>
+              <a:t>, and Sophie Robert. </a:t>
+            </a:r>
+            <a:r>
+              <a:rPr lang="en-US" sz="1600" dirty="0" smtClean="0"/>
+              <a:t>Automatic refinement </a:t>
+            </a:r>
+            <a:r>
+              <a:rPr lang="en-US" sz="1600" dirty="0"/>
+              <a:t>of service compositions. In Florian Daniel, Peter </a:t>
+            </a:r>
+            <a:r>
+              <a:rPr lang="en-US" sz="1600" dirty="0" err="1"/>
+              <a:t>Dolog</a:t>
+            </a:r>
+            <a:r>
+              <a:rPr lang="en-US" sz="1600" dirty="0"/>
+              <a:t>, and Qing </a:t>
+            </a:r>
+            <a:r>
+              <a:rPr lang="en-US" sz="1600" dirty="0" smtClean="0"/>
+              <a:t>Li, editors</a:t>
+            </a:r>
+            <a:r>
+              <a:rPr lang="en-US" sz="1600" dirty="0"/>
+              <a:t>, Web Engineering, volume 7977 of Lecture Notes in Computer Science, pages </a:t>
+            </a:r>
+            <a:r>
+              <a:rPr lang="en-US" sz="1600" dirty="0" smtClean="0"/>
+              <a:t>400-407</a:t>
+            </a:r>
+            <a:r>
+              <a:rPr lang="en-US" sz="1600" dirty="0"/>
+              <a:t>. Springer Berlin Heidelberg, 2013.</a:t>
+            </a:r>
+            <a:endParaRPr lang="en-US" sz="1600" dirty="0"/>
           </a:p>
         </p:txBody>
       </p:sp>
@@ -7850,7 +8634,159 @@
               <a:rPr lang="en-US" dirty="0"/>
               <a:t>: finding valid rewritings</a:t>
             </a:r>
-            <a:endParaRPr lang="en-US" dirty="0"/>
+          </a:p>
+        </p:txBody>
+      </p:sp>
+      <p:sp>
+        <p:nvSpPr>
+          <p:cNvPr id="3" name="Espace réservé du contenu 2"/>
+          <p:cNvSpPr>
+            <a:spLocks noGrp="1"/>
+          </p:cNvSpPr>
+          <p:nvPr>
+            <p:ph sz="quarter" idx="1"/>
+          </p:nvPr>
+        </p:nvSpPr>
+        <p:spPr/>
+        <p:txBody>
+          <a:bodyPr>
+            <a:normAutofit fontScale="92500" lnSpcReduction="10000"/>
+          </a:bodyPr>
+          <a:lstStyle/>
+          <a:p>
+            <a:pPr marL="0" indent="0" algn="just">
+              <a:buNone/>
+            </a:pPr>
+            <a:r>
+              <a:rPr lang="en-US" dirty="0" smtClean="0"/>
+              <a:t>Given a list of combinations of CSDs (a list of lists), identify which of them is a valid rewriting of the original query.</a:t>
+            </a:r>
+          </a:p>
+          <a:p>
+            <a:pPr marL="0" indent="0" algn="just">
+              <a:buNone/>
+            </a:pPr>
+            <a:endParaRPr lang="en-US" dirty="0" smtClean="0"/>
+          </a:p>
+          <a:p>
+            <a:pPr marL="0" indent="0" algn="just">
+              <a:buNone/>
+            </a:pPr>
+            <a:r>
+              <a:rPr lang="en-US" dirty="0" smtClean="0"/>
+              <a:t>A combination of CSDs is a valid rewriting if:</a:t>
+            </a:r>
+          </a:p>
+          <a:p>
+            <a:pPr lvl="1" algn="just"/>
+            <a:r>
+              <a:rPr lang="en-US" dirty="0" smtClean="0"/>
+              <a:t>The number of abstract services in the query is equal to the result of adding the number of abstract services of each CSD</a:t>
+            </a:r>
+          </a:p>
+          <a:p>
+            <a:pPr lvl="1" algn="just"/>
+            <a:r>
+              <a:rPr lang="en-US" dirty="0" smtClean="0"/>
+              <a:t>There is no duplicity/redundancy of abstract services in the list of CSD</a:t>
+            </a:r>
+          </a:p>
+          <a:p>
+            <a:pPr lvl="1" algn="just"/>
+            <a:r>
+              <a:rPr lang="en-US" dirty="0" smtClean="0"/>
+              <a:t>All </a:t>
+            </a:r>
+            <a:r>
+              <a:rPr lang="en-US" i="1" dirty="0" smtClean="0"/>
+              <a:t>head</a:t>
+            </a:r>
+            <a:r>
+              <a:rPr lang="en-US" dirty="0" smtClean="0"/>
+              <a:t> variables in the query must be mapped to a variable in one of the concrete services in the list of CSDs</a:t>
+            </a:r>
+          </a:p>
+          <a:p>
+            <a:pPr lvl="1" algn="just"/>
+            <a:r>
+              <a:rPr lang="en-US" dirty="0" smtClean="0"/>
+              <a:t>If the query has a composite measure, this measure is updated for each rewriting produced, and this measure can not be violated</a:t>
+            </a:r>
+          </a:p>
+          <a:p>
+            <a:pPr marL="0" indent="0" algn="just">
+              <a:buNone/>
+            </a:pPr>
+            <a:endParaRPr lang="en-US" dirty="0" smtClean="0"/>
+          </a:p>
+          <a:p>
+            <a:pPr marL="0" indent="0" algn="just">
+              <a:buNone/>
+            </a:pPr>
+            <a:endParaRPr lang="en-US" dirty="0" smtClean="0"/>
+          </a:p>
+        </p:txBody>
+      </p:sp>
+    </p:spTree>
+    <p:extLst>
+      <p:ext uri="{BB962C8B-B14F-4D97-AF65-F5344CB8AC3E}">
+        <p14:creationId xmlns:p14="http://schemas.microsoft.com/office/powerpoint/2010/main" val="3457335242"/>
+      </p:ext>
+    </p:extLst>
+  </p:cSld>
+  <p:clrMapOvr>
+    <a:masterClrMapping/>
+  </p:clrMapOvr>
+  <p:timing>
+    <p:tnLst>
+      <p:par>
+        <p:cTn id="1" dur="indefinite" restart="never" nodeType="tmRoot"/>
+      </p:par>
+    </p:tnLst>
+  </p:timing>
+</p:sld>
+</file>
+
+<file path=ppt/slides/slide21.xml><?xml version="1.0" encoding="utf-8"?>
+<p:sld xmlns:a="http://schemas.openxmlformats.org/drawingml/2006/main" xmlns:r="http://schemas.openxmlformats.org/officeDocument/2006/relationships" xmlns:p="http://schemas.openxmlformats.org/presentationml/2006/main">
+  <p:cSld>
+    <p:spTree>
+      <p:nvGrpSpPr>
+        <p:cNvPr id="1" name=""/>
+        <p:cNvGrpSpPr/>
+        <p:nvPr/>
+      </p:nvGrpSpPr>
+      <p:grpSpPr>
+        <a:xfrm>
+          <a:off x="0" y="0"/>
+          <a:ext cx="0" cy="0"/>
+          <a:chOff x="0" y="0"/>
+          <a:chExt cx="0" cy="0"/>
+        </a:xfrm>
+      </p:grpSpPr>
+      <p:sp>
+        <p:nvSpPr>
+          <p:cNvPr id="2" name="Titre 1"/>
+          <p:cNvSpPr>
+            <a:spLocks noGrp="1"/>
+          </p:cNvSpPr>
+          <p:nvPr>
+            <p:ph type="title"/>
+          </p:nvPr>
+        </p:nvSpPr>
+        <p:spPr/>
+        <p:txBody>
+          <a:bodyPr/>
+          <a:lstStyle/>
+          <a:p>
+            <a:r>
+              <a:rPr lang="en-US" dirty="0" smtClean="0"/>
+              <a:t>Example</a:t>
+            </a:r>
+            <a:r>
+              <a:rPr lang="en-US" dirty="0"/>
+              <a:t>: finding valid rewritings</a:t>
+            </a:r>
           </a:p>
         </p:txBody>
       </p:sp>
@@ -7922,15 +8858,7 @@
             <a:pPr algn="ctr"/>
             <a:r>
               <a:rPr lang="en-US" dirty="0" smtClean="0"/>
-              <a:t>In our query we have a preference which is associated to the </a:t>
-            </a:r>
-            <a:r>
-              <a:rPr lang="en-US" dirty="0" smtClean="0"/>
-              <a:t>rewritings (composite measure) </a:t>
-            </a:r>
-            <a:r>
-              <a:rPr lang="en-US" dirty="0" smtClean="0"/>
-              <a:t>and not to a single service. Considering this preference, we have to update its value while producing the rewritings.</a:t>
+              <a:t>In our query we have a preference which is associated to the rewritings (composite measure) and not to a single service. Considering this preference, we have to update its value while producing the rewritings.</a:t>
             </a:r>
             <a:endParaRPr lang="en-US" dirty="0"/>
           </a:p>
@@ -8066,31 +8994,7 @@
             </a:r>
             <a:r>
               <a:rPr lang="en-US" dirty="0" smtClean="0"/>
-              <a:t> of each service. The rewritings produced </a:t>
-            </a:r>
-            <a:r>
-              <a:rPr lang="en-US" dirty="0" smtClean="0"/>
-              <a:t>that can satisfy the </a:t>
-            </a:r>
-            <a:r>
-              <a:rPr lang="en-US" dirty="0" smtClean="0"/>
-              <a:t>user preference </a:t>
-            </a:r>
-            <a:r>
-              <a:rPr lang="en-US" dirty="0" smtClean="0"/>
-              <a:t>while </a:t>
-            </a:r>
-            <a:r>
-              <a:rPr lang="en-US" dirty="0" smtClean="0"/>
-              <a:t>aggregating these values are below</a:t>
-            </a:r>
-            <a:r>
-              <a:rPr lang="en-US" dirty="0" smtClean="0"/>
-              <a:t>. Note that more than three rewritings can be produced </a:t>
-            </a:r>
-            <a:r>
-              <a:rPr lang="en-US" dirty="0" smtClean="0"/>
-              <a:t>that composite measure did not exists.</a:t>
+              <a:t> of each service. The rewritings produced that can satisfy the user preference while aggregating these values are below. Note that more than three rewritings can be produced that composite measure did not exists.</a:t>
             </a:r>
             <a:endParaRPr lang="en-US" dirty="0"/>
           </a:p>
@@ -8487,6 +9391,377 @@
           <a:p>
             <a:r>
               <a:rPr lang="en-GB" dirty="0" smtClean="0"/>
+              <a:t>Problem</a:t>
+            </a:r>
+            <a:endParaRPr lang="en-GB" dirty="0"/>
+          </a:p>
+        </p:txBody>
+      </p:sp>
+      <p:sp>
+        <p:nvSpPr>
+          <p:cNvPr id="6" name="Rectangle 5"/>
+          <p:cNvSpPr/>
+          <p:nvPr/>
+        </p:nvSpPr>
+        <p:spPr>
+          <a:xfrm>
+            <a:off x="503548" y="1412776"/>
+            <a:ext cx="8136904" cy="4849639"/>
+          </a:xfrm>
+          <a:prstGeom prst="rect">
+            <a:avLst/>
+          </a:prstGeom>
+        </p:spPr>
+        <p:style>
+          <a:lnRef idx="2">
+            <a:schemeClr val="accent1">
+              <a:shade val="50000"/>
+            </a:schemeClr>
+          </a:lnRef>
+          <a:fillRef idx="1">
+            <a:schemeClr val="accent1"/>
+          </a:fillRef>
+          <a:effectRef idx="0">
+            <a:schemeClr val="accent1"/>
+          </a:effectRef>
+          <a:fontRef idx="minor">
+            <a:schemeClr val="lt1"/>
+          </a:fontRef>
+        </p:style>
+        <p:txBody>
+          <a:bodyPr rtlCol="0" anchor="t"/>
+          <a:lstStyle/>
+          <a:p>
+            <a:r>
+              <a:rPr lang="en-US" b="1" dirty="0" smtClean="0"/>
+              <a:t>References: </a:t>
+            </a:r>
+            <a:r>
+              <a:rPr lang="en-US" b="1" u="sng" dirty="0" smtClean="0"/>
+              <a:t>Query </a:t>
+            </a:r>
+            <a:r>
+              <a:rPr lang="en-US" b="1" u="sng" dirty="0" smtClean="0"/>
+              <a:t>rewriting algorithms in the database domain</a:t>
+            </a:r>
+            <a:r>
+              <a:rPr lang="en-US" dirty="0" smtClean="0"/>
+              <a:t>:</a:t>
+            </a:r>
+          </a:p>
+          <a:p>
+            <a:endParaRPr lang="en-US" dirty="0" smtClean="0"/>
+          </a:p>
+          <a:p>
+            <a:pPr marL="285750" indent="-285750" algn="just">
+              <a:buFont typeface="Arial" panose="020B0604020202020204" pitchFamily="34" charset="0"/>
+              <a:buChar char="•"/>
+            </a:pPr>
+            <a:r>
+              <a:rPr lang="en-US" dirty="0"/>
+              <a:t>Levy A.Y., </a:t>
+            </a:r>
+            <a:r>
+              <a:rPr lang="en-US" dirty="0" err="1"/>
+              <a:t>Rajaraman</a:t>
+            </a:r>
+            <a:r>
+              <a:rPr lang="en-US" dirty="0"/>
+              <a:t> A., </a:t>
+            </a:r>
+            <a:r>
+              <a:rPr lang="en-US" dirty="0" err="1"/>
+              <a:t>Ordille</a:t>
+            </a:r>
+            <a:r>
+              <a:rPr lang="en-US" dirty="0"/>
+              <a:t> J.J. Querying </a:t>
+            </a:r>
+            <a:r>
+              <a:rPr lang="en-US" dirty="0" smtClean="0"/>
+              <a:t>heterogeneous information </a:t>
+            </a:r>
+            <a:r>
+              <a:rPr lang="en-US" dirty="0"/>
+              <a:t>sources using source </a:t>
+            </a:r>
+            <a:r>
+              <a:rPr lang="en-US" dirty="0" smtClean="0"/>
+              <a:t>descriptions. In</a:t>
+            </a:r>
+            <a:r>
+              <a:rPr lang="en-US" dirty="0"/>
+              <a:t>: VLDB, pp. 251–262, </a:t>
+            </a:r>
+            <a:r>
+              <a:rPr lang="en-US" dirty="0" smtClean="0"/>
+              <a:t>1996</a:t>
+            </a:r>
+          </a:p>
+          <a:p>
+            <a:pPr marL="285750" indent="-285750" algn="just">
+              <a:buFont typeface="Arial" panose="020B0604020202020204" pitchFamily="34" charset="0"/>
+              <a:buChar char="•"/>
+            </a:pPr>
+            <a:r>
+              <a:rPr lang="en-US" dirty="0" err="1"/>
+              <a:t>Duschka</a:t>
+            </a:r>
+            <a:r>
+              <a:rPr lang="en-US" dirty="0"/>
+              <a:t> O.M., </a:t>
+            </a:r>
+            <a:r>
+              <a:rPr lang="en-US" dirty="0" err="1"/>
+              <a:t>Genesereth</a:t>
+            </a:r>
+            <a:r>
+              <a:rPr lang="en-US" dirty="0"/>
+              <a:t> M.R. Answering </a:t>
+            </a:r>
+            <a:r>
+              <a:rPr lang="en-US" dirty="0" smtClean="0"/>
+              <a:t>recursive queries </a:t>
+            </a:r>
+            <a:r>
+              <a:rPr lang="en-US" dirty="0"/>
+              <a:t>using views. In: PODS, pp. 109–116, 1997</a:t>
+            </a:r>
+          </a:p>
+          <a:p>
+            <a:pPr marL="285750" indent="-285750" algn="just">
+              <a:buFont typeface="Arial" panose="020B0604020202020204" pitchFamily="34" charset="0"/>
+              <a:buChar char="•"/>
+            </a:pPr>
+            <a:r>
+              <a:rPr lang="en-US" dirty="0" err="1" smtClean="0"/>
+              <a:t>Prasenjit</a:t>
+            </a:r>
+            <a:r>
+              <a:rPr lang="en-US" dirty="0" smtClean="0"/>
+              <a:t> </a:t>
+            </a:r>
+            <a:r>
+              <a:rPr lang="en-US" dirty="0" err="1" smtClean="0"/>
+              <a:t>Mitra</a:t>
+            </a:r>
+            <a:r>
+              <a:rPr lang="en-US" dirty="0" smtClean="0"/>
+              <a:t>. An </a:t>
+            </a:r>
+            <a:r>
+              <a:rPr lang="en-US" dirty="0"/>
+              <a:t>Algorithm for Answering Queries Efficiently Using </a:t>
+            </a:r>
+            <a:r>
+              <a:rPr lang="en-US" dirty="0" smtClean="0"/>
+              <a:t>Views. Stanford </a:t>
+            </a:r>
+            <a:r>
+              <a:rPr lang="en-US" dirty="0"/>
+              <a:t>University Technical </a:t>
+            </a:r>
+            <a:r>
+              <a:rPr lang="en-US" dirty="0" smtClean="0"/>
+              <a:t>Report. </a:t>
+            </a:r>
+            <a:r>
+              <a:rPr lang="en-US" dirty="0"/>
+              <a:t>I</a:t>
+            </a:r>
+            <a:r>
+              <a:rPr lang="en-US" dirty="0" smtClean="0"/>
+              <a:t>n </a:t>
+            </a:r>
+            <a:r>
+              <a:rPr lang="en-US" dirty="0"/>
+              <a:t>Proceedings of the Australasian Database Conference, Jan 2001.</a:t>
+            </a:r>
+          </a:p>
+          <a:p>
+            <a:pPr marL="285750" indent="-285750" algn="just">
+              <a:buFont typeface="Arial" panose="020B0604020202020204" pitchFamily="34" charset="0"/>
+              <a:buChar char="•"/>
+            </a:pPr>
+            <a:r>
+              <a:rPr lang="en-US" dirty="0" smtClean="0"/>
+              <a:t>Rachel </a:t>
+            </a:r>
+            <a:r>
+              <a:rPr lang="en-US" dirty="0" err="1"/>
+              <a:t>Pottinger</a:t>
+            </a:r>
+            <a:r>
+              <a:rPr lang="en-US" dirty="0"/>
+              <a:t> and </a:t>
+            </a:r>
+            <a:r>
+              <a:rPr lang="en-US" dirty="0" err="1"/>
+              <a:t>Alon</a:t>
+            </a:r>
+            <a:r>
+              <a:rPr lang="en-US" dirty="0"/>
+              <a:t> Halevy. </a:t>
+            </a:r>
+            <a:r>
+              <a:rPr lang="en-US" dirty="0" smtClean="0"/>
+              <a:t>MiniCon</a:t>
+            </a:r>
+            <a:r>
+              <a:rPr lang="en-US" dirty="0"/>
+              <a:t>: A scalable algorithm for answering queries using views. </a:t>
+            </a:r>
+            <a:r>
+              <a:rPr lang="en-US" i="1" dirty="0"/>
+              <a:t>The VLDB Journal</a:t>
+            </a:r>
+            <a:r>
+              <a:rPr lang="en-US" dirty="0"/>
+              <a:t> 10, 2-3 (September 2001), </a:t>
+            </a:r>
+            <a:r>
+              <a:rPr lang="en-US" dirty="0" smtClean="0"/>
+              <a:t>182-198, 2001.</a:t>
+            </a:r>
+          </a:p>
+          <a:p>
+            <a:pPr marL="285750" indent="-285750" algn="just">
+              <a:buFont typeface="Arial" panose="020B0604020202020204" pitchFamily="34" charset="0"/>
+              <a:buChar char="•"/>
+            </a:pPr>
+            <a:r>
+              <a:rPr lang="en-US" dirty="0"/>
+              <a:t>Chen </a:t>
+            </a:r>
+            <a:r>
+              <a:rPr lang="en-US" dirty="0" smtClean="0"/>
+              <a:t>Li. Rewriting </a:t>
+            </a:r>
+            <a:r>
+              <a:rPr lang="en-US" dirty="0"/>
+              <a:t>Queries using </a:t>
+            </a:r>
+            <a:r>
+              <a:rPr lang="en-US" dirty="0" smtClean="0"/>
+              <a:t>Views</a:t>
+            </a:r>
+            <a:r>
+              <a:rPr lang="en-US" dirty="0"/>
+              <a:t>.</a:t>
+            </a:r>
+            <a:r>
+              <a:rPr lang="en-US" dirty="0" smtClean="0"/>
+              <a:t> </a:t>
+            </a:r>
+            <a:r>
+              <a:rPr lang="en-US" dirty="0"/>
+              <a:t>Encyclopedia of Database Systems 2009: 2438-2441.</a:t>
+            </a:r>
+            <a:endParaRPr lang="en-US" dirty="0" smtClean="0"/>
+          </a:p>
+          <a:p>
+            <a:pPr marL="285750" indent="-285750" algn="just">
+              <a:buFont typeface="Arial" panose="020B0604020202020204" pitchFamily="34" charset="0"/>
+              <a:buChar char="•"/>
+            </a:pPr>
+            <a:r>
+              <a:rPr lang="en-US" dirty="0" smtClean="0"/>
+              <a:t>George </a:t>
+            </a:r>
+            <a:r>
+              <a:rPr lang="en-US" dirty="0" err="1"/>
+              <a:t>Konstantinidis</a:t>
+            </a:r>
+            <a:r>
+              <a:rPr lang="en-US" dirty="0"/>
+              <a:t> and José Luis </a:t>
+            </a:r>
+            <a:r>
+              <a:rPr lang="en-US" dirty="0" err="1"/>
+              <a:t>Ambite</a:t>
+            </a:r>
+            <a:r>
+              <a:rPr lang="en-US" dirty="0"/>
+              <a:t>. </a:t>
+            </a:r>
+            <a:r>
+              <a:rPr lang="en-US" dirty="0" smtClean="0"/>
+              <a:t>Optimizing </a:t>
+            </a:r>
+            <a:r>
+              <a:rPr lang="en-US" dirty="0"/>
+              <a:t>query rewriting for multiple queries. In Proceedings of the Ninth International Workshop on Information Integration on the Web (</a:t>
+            </a:r>
+            <a:r>
+              <a:rPr lang="en-US" dirty="0" err="1"/>
+              <a:t>IIWeb</a:t>
+            </a:r>
+            <a:r>
+              <a:rPr lang="en-US" dirty="0"/>
+              <a:t> '12). ACM, New York, NY, USA, , Article 7 , 6 </a:t>
+            </a:r>
+            <a:r>
+              <a:rPr lang="en-US" dirty="0" smtClean="0"/>
+              <a:t>pages, 2012.</a:t>
+            </a:r>
+            <a:endParaRPr lang="en-US" dirty="0" smtClean="0"/>
+          </a:p>
+        </p:txBody>
+      </p:sp>
+    </p:spTree>
+    <p:extLst>
+      <p:ext uri="{BB962C8B-B14F-4D97-AF65-F5344CB8AC3E}">
+        <p14:creationId xmlns:p14="http://schemas.microsoft.com/office/powerpoint/2010/main" val="3627274029"/>
+      </p:ext>
+    </p:extLst>
+  </p:cSld>
+  <p:clrMapOvr>
+    <a:masterClrMapping/>
+  </p:clrMapOvr>
+  <p:timing>
+    <p:tnLst>
+      <p:par>
+        <p:cTn id="1" dur="indefinite" restart="never" nodeType="tmRoot"/>
+      </p:par>
+    </p:tnLst>
+  </p:timing>
+</p:sld>
+</file>
+
+<file path=ppt/slides/slide4.xml><?xml version="1.0" encoding="utf-8"?>
+<p:sld xmlns:a="http://schemas.openxmlformats.org/drawingml/2006/main" xmlns:r="http://schemas.openxmlformats.org/officeDocument/2006/relationships" xmlns:p="http://schemas.openxmlformats.org/presentationml/2006/main">
+  <p:cSld>
+    <p:spTree>
+      <p:nvGrpSpPr>
+        <p:cNvPr id="1" name=""/>
+        <p:cNvGrpSpPr/>
+        <p:nvPr/>
+      </p:nvGrpSpPr>
+      <p:grpSpPr>
+        <a:xfrm>
+          <a:off x="0" y="0"/>
+          <a:ext cx="0" cy="0"/>
+          <a:chOff x="0" y="0"/>
+          <a:chExt cx="0" cy="0"/>
+        </a:xfrm>
+      </p:grpSpPr>
+      <p:sp>
+        <p:nvSpPr>
+          <p:cNvPr id="2" name="Titre 1"/>
+          <p:cNvSpPr>
+            <a:spLocks noGrp="1"/>
+          </p:cNvSpPr>
+          <p:nvPr>
+            <p:ph type="title"/>
+          </p:nvPr>
+        </p:nvSpPr>
+        <p:spPr/>
+        <p:txBody>
+          <a:bodyPr/>
+          <a:lstStyle/>
+          <a:p>
+            <a:r>
+              <a:rPr lang="en-GB" dirty="0" smtClean="0"/>
               <a:t>Hypothesis</a:t>
             </a:r>
             <a:endParaRPr lang="en-GB" dirty="0"/>
@@ -8515,33 +9790,21 @@
             </a:pPr>
             <a:r>
               <a:rPr lang="en-GB" dirty="0" smtClean="0"/>
-              <a:t>We assume </a:t>
-            </a:r>
+              <a:t>We assume that:</a:t>
+            </a:r>
+          </a:p>
+          <a:p>
+            <a:pPr algn="just"/>
             <a:r>
               <a:rPr lang="en-GB" dirty="0" smtClean="0"/>
-              <a:t>that:</a:t>
+              <a:t>The query expresses an abstract composition that describes the requirements of a user. It is expressed with respect to a catalogue of abstract services</a:t>
             </a:r>
           </a:p>
           <a:p>
             <a:pPr algn="just"/>
             <a:r>
               <a:rPr lang="en-GB" dirty="0" smtClean="0"/>
-              <a:t>The </a:t>
-            </a:r>
-            <a:r>
-              <a:rPr lang="en-GB" dirty="0" smtClean="0"/>
-              <a:t>query expresses an abstract composition that describes the requirements of a user. It is expressed with respect to a catalogue of abstract services</a:t>
-            </a:r>
-          </a:p>
-          <a:p>
-            <a:pPr algn="just"/>
-            <a:r>
-              <a:rPr lang="en-GB" dirty="0" smtClean="0"/>
-              <a:t>A concrete service </a:t>
-            </a:r>
-            <a:r>
-              <a:rPr lang="en-GB" dirty="0" smtClean="0"/>
-              <a:t>is defined in terms of an abstract composition. </a:t>
+              <a:t>A concrete service is defined in terms of an abstract composition. </a:t>
             </a:r>
             <a:r>
               <a:rPr lang="en-GB" dirty="0"/>
@@ -8549,11 +9812,7 @@
             </a:r>
             <a:r>
               <a:rPr lang="en-GB" dirty="0" smtClean="0"/>
-              <a:t>a single abstract service or to a composition </a:t>
-            </a:r>
-            <a:r>
-              <a:rPr lang="en-GB" dirty="0" smtClean="0"/>
-              <a:t>of abstract services</a:t>
+              <a:t>a single abstract service or to a composition of abstract services</a:t>
             </a:r>
           </a:p>
           <a:p>
@@ -8589,7 +9848,6 @@
               <a:rPr lang="en-GB" i="1" dirty="0" smtClean="0"/>
               <a:t>value</a:t>
             </a:r>
-            <a:endParaRPr lang="en-GB" i="1" dirty="0" smtClean="0"/>
           </a:p>
         </p:txBody>
       </p:sp>
@@ -9334,7 +10592,7 @@
 </p:sld>
 </file>
 
-<file path=ppt/slides/slide4.xml><?xml version="1.0" encoding="utf-8"?>
+<file path=ppt/slides/slide5.xml><?xml version="1.0" encoding="utf-8"?>
 <p:sld xmlns:a="http://schemas.openxmlformats.org/drawingml/2006/main" xmlns:r="http://schemas.openxmlformats.org/officeDocument/2006/relationships" xmlns:p="http://schemas.openxmlformats.org/presentationml/2006/main">
   <p:cSld>
     <p:spTree>
@@ -9396,11 +10654,7 @@
             </a:pPr>
             <a:r>
               <a:rPr lang="en-GB" dirty="0" smtClean="0"/>
-              <a:t>We assume </a:t>
-            </a:r>
-            <a:r>
-              <a:rPr lang="en-GB" dirty="0" smtClean="0"/>
-              <a:t>that:</a:t>
+              <a:t>We assume that:</a:t>
             </a:r>
           </a:p>
           <a:p>
@@ -10077,7 +11331,7 @@
 </p:sld>
 </file>
 
-<file path=ppt/slides/slide5.xml><?xml version="1.0" encoding="utf-8"?>
+<file path=ppt/slides/slide6.xml><?xml version="1.0" encoding="utf-8"?>
 <p:sld xmlns:a="http://schemas.openxmlformats.org/drawingml/2006/main" xmlns:r="http://schemas.openxmlformats.org/officeDocument/2006/relationships" xmlns:p="http://schemas.openxmlformats.org/presentationml/2006/main">
   <p:cSld>
     <p:spTree>
@@ -10593,7 +11847,7 @@
 </p:sld>
 </file>
 
-<file path=ppt/slides/slide6.xml><?xml version="1.0" encoding="utf-8"?>
+<file path=ppt/slides/slide7.xml><?xml version="1.0" encoding="utf-8"?>
 <p:sld xmlns:a="http://schemas.openxmlformats.org/drawingml/2006/main" xmlns:r="http://schemas.openxmlformats.org/officeDocument/2006/relationships" xmlns:p="http://schemas.openxmlformats.org/presentationml/2006/main">
   <p:cSld>
     <p:spTree>
@@ -10903,15 +12157,7 @@
             </a:r>
             <a:r>
               <a:rPr lang="en-US" sz="1600" dirty="0" smtClean="0"/>
-              <a:t> (p?, dna!){p=“K”}[availability &gt; 98, price per call &lt; </a:t>
-            </a:r>
-            <a:r>
-              <a:rPr lang="en-US" sz="1600" dirty="0" smtClean="0"/>
-              <a:t>0.2</a:t>
-            </a:r>
-            <a:r>
-              <a:rPr lang="en-US" sz="1600" dirty="0" smtClean="0"/>
-              <a:t>, total cost &lt; 1]</a:t>
+              <a:t> (p?, dna!){p=“K”}[availability &gt; 98, price per call &lt; 0.2, total cost &lt; 1]</a:t>
             </a:r>
           </a:p>
           <a:p>
@@ -11107,7 +12353,7 @@
 </p:sld>
 </file>
 
-<file path=ppt/slides/slide7.xml><?xml version="1.0" encoding="utf-8"?>
+<file path=ppt/slides/slide8.xml><?xml version="1.0" encoding="utf-8"?>
 <p:sld xmlns:a="http://schemas.openxmlformats.org/drawingml/2006/main" xmlns:r="http://schemas.openxmlformats.org/officeDocument/2006/relationships" xmlns:p="http://schemas.openxmlformats.org/presentationml/2006/main">
   <p:cSld>
     <p:spTree>
@@ -11182,23 +12428,11 @@
             </a:r>
             <a:r>
               <a:rPr lang="en-GB" dirty="0" smtClean="0"/>
-              <a:t> expressing a service </a:t>
-            </a:r>
-            <a:r>
-              <a:rPr lang="en-GB" dirty="0" smtClean="0"/>
-              <a:t>composition and </a:t>
-            </a:r>
-            <a:r>
-              <a:rPr lang="en-GB" dirty="0" smtClean="0"/>
-              <a:t>set of quality preferences, </a:t>
+              <a:t> expressing a service composition and set of quality preferences, </a:t>
             </a:r>
             <a:r>
               <a:rPr lang="en-GB" i="1" dirty="0" smtClean="0"/>
-              <a:t>find </a:t>
-            </a:r>
-            <a:r>
-              <a:rPr lang="en-GB" i="1" dirty="0" smtClean="0"/>
-              <a:t>concrete services</a:t>
+              <a:t>find concrete services</a:t>
             </a:r>
             <a:r>
               <a:rPr lang="en-GB" dirty="0" smtClean="0"/>
@@ -12535,7 +13769,7 @@
 </p:sld>
 </file>
 
-<file path=ppt/slides/slide8.xml><?xml version="1.0" encoding="utf-8"?>
+<file path=ppt/slides/slide9.xml><?xml version="1.0" encoding="utf-8"?>
 <p:sld xmlns:a="http://schemas.openxmlformats.org/drawingml/2006/main" xmlns:r="http://schemas.openxmlformats.org/officeDocument/2006/relationships" xmlns:p="http://schemas.openxmlformats.org/presentationml/2006/main">
   <p:cSld>
     <p:spTree>
@@ -12746,7 +13980,6 @@
               <a:rPr lang="en-US" dirty="0" smtClean="0"/>
               <a:t>!)</a:t>
             </a:r>
-            <a:endParaRPr lang="en-US" dirty="0" smtClean="0"/>
           </a:p>
           <a:p>
             <a:pPr algn="just"/>
@@ -12875,149 +14108,6 @@
     <p:bldLst>
       <p:bldP spid="4" grpId="0" animBg="1"/>
     </p:bldLst>
-  </p:timing>
-</p:sld>
-</file>
-
-<file path=ppt/slides/slide9.xml><?xml version="1.0" encoding="utf-8"?>
-<p:sld xmlns:a="http://schemas.openxmlformats.org/drawingml/2006/main" xmlns:r="http://schemas.openxmlformats.org/officeDocument/2006/relationships" xmlns:p="http://schemas.openxmlformats.org/presentationml/2006/main">
-  <p:cSld>
-    <p:spTree>
-      <p:nvGrpSpPr>
-        <p:cNvPr id="1" name=""/>
-        <p:cNvGrpSpPr/>
-        <p:nvPr/>
-      </p:nvGrpSpPr>
-      <p:grpSpPr>
-        <a:xfrm>
-          <a:off x="0" y="0"/>
-          <a:ext cx="0" cy="0"/>
-          <a:chOff x="0" y="0"/>
-          <a:chExt cx="0" cy="0"/>
-        </a:xfrm>
-      </p:grpSpPr>
-      <p:sp>
-        <p:nvSpPr>
-          <p:cNvPr id="2" name="Titre 1"/>
-          <p:cNvSpPr>
-            <a:spLocks noGrp="1"/>
-          </p:cNvSpPr>
-          <p:nvPr>
-            <p:ph type="title"/>
-          </p:nvPr>
-        </p:nvSpPr>
-        <p:spPr/>
-        <p:txBody>
-          <a:bodyPr/>
-          <a:lstStyle/>
-          <a:p>
-            <a:r>
-              <a:rPr lang="en-GB" dirty="0" smtClean="0"/>
-              <a:t>Principle</a:t>
-            </a:r>
-            <a:endParaRPr lang="en-GB" dirty="0"/>
-          </a:p>
-        </p:txBody>
-      </p:sp>
-      <p:sp>
-        <p:nvSpPr>
-          <p:cNvPr id="3" name="Espace réservé du contenu 2"/>
-          <p:cNvSpPr>
-            <a:spLocks noGrp="1"/>
-          </p:cNvSpPr>
-          <p:nvPr>
-            <p:ph sz="quarter" idx="1"/>
-          </p:nvPr>
-        </p:nvSpPr>
-        <p:spPr/>
-        <p:txBody>
-          <a:bodyPr/>
-          <a:lstStyle/>
-          <a:p>
-            <a:pPr marL="0" indent="0" algn="just">
-              <a:buNone/>
-            </a:pPr>
-            <a:r>
-              <a:rPr lang="en-GB" dirty="0" smtClean="0"/>
-              <a:t>Given: (i) a query and user quality preferences; and (ii) a set of concrete services tagged with quality measures.</a:t>
-            </a:r>
-          </a:p>
-          <a:p>
-            <a:pPr algn="just"/>
-            <a:r>
-              <a:rPr lang="en-GB" dirty="0" smtClean="0"/>
-              <a:t>Looks </a:t>
-            </a:r>
-            <a:r>
-              <a:rPr lang="en-GB" dirty="0" smtClean="0"/>
-              <a:t>for </a:t>
-            </a:r>
-            <a:r>
-              <a:rPr lang="en-GB" i="1" dirty="0" smtClean="0"/>
-              <a:t>concrete </a:t>
-            </a:r>
-            <a:r>
-              <a:rPr lang="en-GB" i="1" dirty="0" smtClean="0"/>
-              <a:t>services </a:t>
-            </a:r>
-            <a:r>
-              <a:rPr lang="en-GB" dirty="0" smtClean="0"/>
-              <a:t>which respect the matching rules</a:t>
-            </a:r>
-          </a:p>
-          <a:p>
-            <a:pPr algn="just"/>
-            <a:endParaRPr lang="en-GB" dirty="0" smtClean="0"/>
-          </a:p>
-          <a:p>
-            <a:pPr algn="just"/>
-            <a:r>
-              <a:rPr lang="en-GB" dirty="0" smtClean="0"/>
-              <a:t>The concrete service that matches the rules is a </a:t>
-            </a:r>
-            <a:r>
-              <a:rPr lang="en-GB" i="1" dirty="0" smtClean="0"/>
-              <a:t>candidate concrete service</a:t>
-            </a:r>
-          </a:p>
-          <a:p>
-            <a:pPr algn="just"/>
-            <a:endParaRPr lang="en-GB" dirty="0"/>
-          </a:p>
-          <a:p>
-            <a:pPr algn="just"/>
-            <a:r>
-              <a:rPr lang="en-GB" dirty="0" smtClean="0"/>
-              <a:t>As result we build list of </a:t>
-            </a:r>
-            <a:r>
-              <a:rPr lang="en-GB" i="1" dirty="0" smtClean="0"/>
-              <a:t>candidate concrete services </a:t>
-            </a:r>
-            <a:r>
-              <a:rPr lang="en-GB" dirty="0" smtClean="0"/>
-              <a:t>which may be used in the rewriting process</a:t>
-            </a:r>
-            <a:endParaRPr lang="en-GB" dirty="0"/>
-          </a:p>
-        </p:txBody>
-      </p:sp>
-    </p:spTree>
-    <p:extLst>
-      <p:ext uri="{BB962C8B-B14F-4D97-AF65-F5344CB8AC3E}">
-        <p14:creationId xmlns:p14="http://schemas.microsoft.com/office/powerpoint/2010/main" val="1751865181"/>
-      </p:ext>
-    </p:extLst>
-  </p:cSld>
-  <p:clrMapOvr>
-    <a:masterClrMapping/>
-  </p:clrMapOvr>
-  <p:timing>
-    <p:tnLst>
-      <p:par>
-        <p:cTn id="1" dur="indefinite" restart="never" nodeType="tmRoot"/>
-      </p:par>
-    </p:tnLst>
   </p:timing>
 </p:sld>
 </file>

</xml_diff>